<commit_message>
(DOC) Refactoring + todos
</commit_message>
<xml_diff>
--- a/Website_TdA_2024.pptx
+++ b/Website_TdA_2024.pptx
@@ -133,7 +133,7 @@
 <file path=ppt/revisionInfo.xml><?xml version="1.0" encoding="utf-8"?>
 <p1510:revInfo xmlns:a="http://schemas.openxmlformats.org/drawingml/2006/main" xmlns:r="http://schemas.openxmlformats.org/officeDocument/2006/relationships" xmlns:p1510="http://schemas.microsoft.com/office/powerpoint/2015/10/main">
   <p1510:revLst>
-    <p1510:client id="{96D7FF0F-B081-4A9D-BD68-D3EBAC727EF5}" v="204" dt="2024-02-07T12:45:42.285"/>
+    <p1510:client id="{96D7FF0F-B081-4A9D-BD68-D3EBAC727EF5}" v="211" dt="2024-02-13T08:27:33.621"/>
   </p1510:revLst>
 </p1510:revInfo>
 </file>
@@ -143,7 +143,7 @@
   <pc:docChgLst>
     <pc:chgData name="Stapel, Frederic" userId="1abc07cd-784c-4ede-87bc-7246762e1d08" providerId="ADAL" clId="{96D7FF0F-B081-4A9D-BD68-D3EBAC727EF5}"/>
     <pc:docChg chg="undo redo custSel addSld delSld modSld sldOrd">
-      <pc:chgData name="Stapel, Frederic" userId="1abc07cd-784c-4ede-87bc-7246762e1d08" providerId="ADAL" clId="{96D7FF0F-B081-4A9D-BD68-D3EBAC727EF5}" dt="2024-02-07T12:46:01.414" v="3886" actId="1076"/>
+      <pc:chgData name="Stapel, Frederic" userId="1abc07cd-784c-4ede-87bc-7246762e1d08" providerId="ADAL" clId="{96D7FF0F-B081-4A9D-BD68-D3EBAC727EF5}" dt="2024-02-13T08:27:11.672" v="3994" actId="20577"/>
       <pc:docMkLst>
         <pc:docMk/>
       </pc:docMkLst>
@@ -209,7 +209,7 @@
         </pc:spChg>
       </pc:sldChg>
       <pc:sldChg chg="addSp delSp modSp new mod ord">
-        <pc:chgData name="Stapel, Frederic" userId="1abc07cd-784c-4ede-87bc-7246762e1d08" providerId="ADAL" clId="{96D7FF0F-B081-4A9D-BD68-D3EBAC727EF5}" dt="2024-01-22T12:39:52.814" v="1800" actId="20577"/>
+        <pc:chgData name="Stapel, Frederic" userId="1abc07cd-784c-4ede-87bc-7246762e1d08" providerId="ADAL" clId="{96D7FF0F-B081-4A9D-BD68-D3EBAC727EF5}" dt="2024-02-13T08:27:11.672" v="3994" actId="20577"/>
         <pc:sldMkLst>
           <pc:docMk/>
           <pc:sldMk cId="2805550147" sldId="259"/>
@@ -223,7 +223,7 @@
           </ac:spMkLst>
         </pc:spChg>
         <pc:spChg chg="mod">
-          <ac:chgData name="Stapel, Frederic" userId="1abc07cd-784c-4ede-87bc-7246762e1d08" providerId="ADAL" clId="{96D7FF0F-B081-4A9D-BD68-D3EBAC727EF5}" dt="2024-01-22T12:39:52.814" v="1800" actId="20577"/>
+          <ac:chgData name="Stapel, Frederic" userId="1abc07cd-784c-4ede-87bc-7246762e1d08" providerId="ADAL" clId="{96D7FF0F-B081-4A9D-BD68-D3EBAC727EF5}" dt="2024-02-13T08:27:11.672" v="3994" actId="20577"/>
           <ac:spMkLst>
             <pc:docMk/>
             <pc:sldMk cId="2805550147" sldId="259"/>
@@ -342,11 +342,19 @@
         </pc:spChg>
       </pc:sldChg>
       <pc:sldChg chg="addSp delSp modSp new mod">
-        <pc:chgData name="Stapel, Frederic" userId="1abc07cd-784c-4ede-87bc-7246762e1d08" providerId="ADAL" clId="{96D7FF0F-B081-4A9D-BD68-D3EBAC727EF5}" dt="2024-01-22T09:36:14.108" v="1026" actId="478"/>
+        <pc:chgData name="Stapel, Frederic" userId="1abc07cd-784c-4ede-87bc-7246762e1d08" providerId="ADAL" clId="{96D7FF0F-B081-4A9D-BD68-D3EBAC727EF5}" dt="2024-02-13T07:42:28.092" v="3951" actId="1076"/>
         <pc:sldMkLst>
           <pc:docMk/>
           <pc:sldMk cId="3375661274" sldId="262"/>
         </pc:sldMkLst>
+        <pc:spChg chg="add mod">
+          <ac:chgData name="Stapel, Frederic" userId="1abc07cd-784c-4ede-87bc-7246762e1d08" providerId="ADAL" clId="{96D7FF0F-B081-4A9D-BD68-D3EBAC727EF5}" dt="2024-02-13T07:42:28.092" v="3951" actId="1076"/>
+          <ac:spMkLst>
+            <pc:docMk/>
+            <pc:sldMk cId="3375661274" sldId="262"/>
+            <ac:spMk id="2" creationId="{29F0D2FF-399F-B96F-A9E1-06411514C1C7}"/>
+          </ac:spMkLst>
+        </pc:spChg>
         <pc:spChg chg="del">
           <ac:chgData name="Stapel, Frederic" userId="1abc07cd-784c-4ede-87bc-7246762e1d08" providerId="ADAL" clId="{96D7FF0F-B081-4A9D-BD68-D3EBAC727EF5}" dt="2024-01-22T09:36:14.108" v="1026" actId="478"/>
           <ac:spMkLst>
@@ -714,13 +722,13 @@
         </pc:picChg>
       </pc:sldChg>
       <pc:sldChg chg="modSp new mod">
-        <pc:chgData name="Stapel, Frederic" userId="1abc07cd-784c-4ede-87bc-7246762e1d08" providerId="ADAL" clId="{96D7FF0F-B081-4A9D-BD68-D3EBAC727EF5}" dt="2024-01-22T13:36:06.040" v="2117" actId="114"/>
+        <pc:chgData name="Stapel, Frederic" userId="1abc07cd-784c-4ede-87bc-7246762e1d08" providerId="ADAL" clId="{96D7FF0F-B081-4A9D-BD68-D3EBAC727EF5}" dt="2024-02-13T07:46:29.026" v="3964" actId="20577"/>
         <pc:sldMkLst>
           <pc:docMk/>
           <pc:sldMk cId="385142847" sldId="265"/>
         </pc:sldMkLst>
         <pc:spChg chg="mod">
-          <ac:chgData name="Stapel, Frederic" userId="1abc07cd-784c-4ede-87bc-7246762e1d08" providerId="ADAL" clId="{96D7FF0F-B081-4A9D-BD68-D3EBAC727EF5}" dt="2024-01-22T10:09:04.277" v="1407" actId="20577"/>
+          <ac:chgData name="Stapel, Frederic" userId="1abc07cd-784c-4ede-87bc-7246762e1d08" providerId="ADAL" clId="{96D7FF0F-B081-4A9D-BD68-D3EBAC727EF5}" dt="2024-02-13T07:46:29.026" v="3964" actId="20577"/>
           <ac:spMkLst>
             <pc:docMk/>
             <pc:sldMk cId="385142847" sldId="265"/>
@@ -870,11 +878,27 @@
         </pc:picChg>
       </pc:sldChg>
       <pc:sldChg chg="addSp delSp modSp add mod">
-        <pc:chgData name="Stapel, Frederic" userId="1abc07cd-784c-4ede-87bc-7246762e1d08" providerId="ADAL" clId="{96D7FF0F-B081-4A9D-BD68-D3EBAC727EF5}" dt="2024-02-07T09:29:56.595" v="2468" actId="14100"/>
+        <pc:chgData name="Stapel, Frederic" userId="1abc07cd-784c-4ede-87bc-7246762e1d08" providerId="ADAL" clId="{96D7FF0F-B081-4A9D-BD68-D3EBAC727EF5}" dt="2024-02-13T07:44:04.464" v="3954"/>
         <pc:sldMkLst>
           <pc:docMk/>
           <pc:sldMk cId="1179069388" sldId="269"/>
         </pc:sldMkLst>
+        <pc:spChg chg="add del mod">
+          <ac:chgData name="Stapel, Frederic" userId="1abc07cd-784c-4ede-87bc-7246762e1d08" providerId="ADAL" clId="{96D7FF0F-B081-4A9D-BD68-D3EBAC727EF5}" dt="2024-02-13T07:44:00.197" v="3953" actId="478"/>
+          <ac:spMkLst>
+            <pc:docMk/>
+            <pc:sldMk cId="1179069388" sldId="269"/>
+            <ac:spMk id="2" creationId="{F5EF86D2-C31E-D08C-72C7-D02D492A9A4A}"/>
+          </ac:spMkLst>
+        </pc:spChg>
+        <pc:spChg chg="add mod">
+          <ac:chgData name="Stapel, Frederic" userId="1abc07cd-784c-4ede-87bc-7246762e1d08" providerId="ADAL" clId="{96D7FF0F-B081-4A9D-BD68-D3EBAC727EF5}" dt="2024-02-13T07:44:04.464" v="3954"/>
+          <ac:spMkLst>
+            <pc:docMk/>
+            <pc:sldMk cId="1179069388" sldId="269"/>
+            <ac:spMk id="4" creationId="{99D6F540-8056-95F6-5D80-34D83A55A612}"/>
+          </ac:spMkLst>
+        </pc:spChg>
         <pc:picChg chg="mod">
           <ac:chgData name="Stapel, Frederic" userId="1abc07cd-784c-4ede-87bc-7246762e1d08" providerId="ADAL" clId="{96D7FF0F-B081-4A9D-BD68-D3EBAC727EF5}" dt="2024-02-07T09:29:30.853" v="2459" actId="1076"/>
           <ac:picMkLst>
@@ -2348,7 +2372,7 @@
           <a:p>
             <a:fld id="{326D799F-86D4-4539-9CF8-30237CED92B1}" type="datetimeFigureOut">
               <a:rPr lang="de-DE" smtClean="0"/>
-              <a:t>07.02.2024</a:t>
+              <a:t>13.02.2024</a:t>
             </a:fld>
             <a:endParaRPr lang="de-DE"/>
           </a:p>
@@ -2846,7 +2870,7 @@
           <a:p>
             <a:fld id="{5F34389D-718A-4B70-99B4-5B2AAB6EE550}" type="datetimeFigureOut">
               <a:rPr lang="de-DE" smtClean="0"/>
-              <a:t>07.02.2024</a:t>
+              <a:t>13.02.2024</a:t>
             </a:fld>
             <a:endParaRPr lang="de-DE"/>
           </a:p>
@@ -3044,7 +3068,7 @@
           <a:p>
             <a:fld id="{5F34389D-718A-4B70-99B4-5B2AAB6EE550}" type="datetimeFigureOut">
               <a:rPr lang="de-DE" smtClean="0"/>
-              <a:t>07.02.2024</a:t>
+              <a:t>13.02.2024</a:t>
             </a:fld>
             <a:endParaRPr lang="de-DE"/>
           </a:p>
@@ -3252,7 +3276,7 @@
           <a:p>
             <a:fld id="{5F34389D-718A-4B70-99B4-5B2AAB6EE550}" type="datetimeFigureOut">
               <a:rPr lang="de-DE" smtClean="0"/>
-              <a:t>07.02.2024</a:t>
+              <a:t>13.02.2024</a:t>
             </a:fld>
             <a:endParaRPr lang="de-DE"/>
           </a:p>
@@ -3450,7 +3474,7 @@
           <a:p>
             <a:fld id="{5F34389D-718A-4B70-99B4-5B2AAB6EE550}" type="datetimeFigureOut">
               <a:rPr lang="de-DE" smtClean="0"/>
-              <a:t>07.02.2024</a:t>
+              <a:t>13.02.2024</a:t>
             </a:fld>
             <a:endParaRPr lang="de-DE"/>
           </a:p>
@@ -3725,7 +3749,7 @@
           <a:p>
             <a:fld id="{5F34389D-718A-4B70-99B4-5B2AAB6EE550}" type="datetimeFigureOut">
               <a:rPr lang="de-DE" smtClean="0"/>
-              <a:t>07.02.2024</a:t>
+              <a:t>13.02.2024</a:t>
             </a:fld>
             <a:endParaRPr lang="de-DE"/>
           </a:p>
@@ -3990,7 +4014,7 @@
           <a:p>
             <a:fld id="{5F34389D-718A-4B70-99B4-5B2AAB6EE550}" type="datetimeFigureOut">
               <a:rPr lang="de-DE" smtClean="0"/>
-              <a:t>07.02.2024</a:t>
+              <a:t>13.02.2024</a:t>
             </a:fld>
             <a:endParaRPr lang="de-DE"/>
           </a:p>
@@ -4402,7 +4426,7 @@
           <a:p>
             <a:fld id="{5F34389D-718A-4B70-99B4-5B2AAB6EE550}" type="datetimeFigureOut">
               <a:rPr lang="de-DE" smtClean="0"/>
-              <a:t>07.02.2024</a:t>
+              <a:t>13.02.2024</a:t>
             </a:fld>
             <a:endParaRPr lang="de-DE"/>
           </a:p>
@@ -4543,7 +4567,7 @@
           <a:p>
             <a:fld id="{5F34389D-718A-4B70-99B4-5B2AAB6EE550}" type="datetimeFigureOut">
               <a:rPr lang="de-DE" smtClean="0"/>
-              <a:t>07.02.2024</a:t>
+              <a:t>13.02.2024</a:t>
             </a:fld>
             <a:endParaRPr lang="de-DE"/>
           </a:p>
@@ -4656,7 +4680,7 @@
           <a:p>
             <a:fld id="{5F34389D-718A-4B70-99B4-5B2AAB6EE550}" type="datetimeFigureOut">
               <a:rPr lang="de-DE" smtClean="0"/>
-              <a:t>07.02.2024</a:t>
+              <a:t>13.02.2024</a:t>
             </a:fld>
             <a:endParaRPr lang="de-DE"/>
           </a:p>
@@ -4967,7 +4991,7 @@
           <a:p>
             <a:fld id="{5F34389D-718A-4B70-99B4-5B2AAB6EE550}" type="datetimeFigureOut">
               <a:rPr lang="de-DE" smtClean="0"/>
-              <a:t>07.02.2024</a:t>
+              <a:t>13.02.2024</a:t>
             </a:fld>
             <a:endParaRPr lang="de-DE"/>
           </a:p>
@@ -5255,7 +5279,7 @@
           <a:p>
             <a:fld id="{5F34389D-718A-4B70-99B4-5B2AAB6EE550}" type="datetimeFigureOut">
               <a:rPr lang="de-DE" smtClean="0"/>
-              <a:t>07.02.2024</a:t>
+              <a:t>13.02.2024</a:t>
             </a:fld>
             <a:endParaRPr lang="de-DE"/>
           </a:p>
@@ -5496,7 +5520,7 @@
           <a:p>
             <a:fld id="{5F34389D-718A-4B70-99B4-5B2AAB6EE550}" type="datetimeFigureOut">
               <a:rPr lang="de-DE" smtClean="0"/>
-              <a:t>07.02.2024</a:t>
+              <a:t>13.02.2024</a:t>
             </a:fld>
             <a:endParaRPr lang="de-DE"/>
           </a:p>
@@ -6077,7 +6101,10 @@
               <a:rPr lang="de-DE" dirty="0" err="1"/>
               <a:t>Klickdummy</a:t>
             </a:r>
-            <a:endParaRPr lang="de-DE" dirty="0"/>
+            <a:r>
+              <a:rPr lang="de-DE" dirty="0"/>
+              <a:t> (V 0.1)</a:t>
+            </a:r>
           </a:p>
         </p:txBody>
       </p:sp>
@@ -8381,15 +8408,42 @@
           <a:p>
             <a:r>
               <a:rPr lang="de-DE" dirty="0"/>
+              <a:t>Repo auf </a:t>
+            </a:r>
+            <a:r>
+              <a:rPr lang="de-DE" dirty="0" err="1">
+                <a:hlinkClick r:id="rId2"/>
+              </a:rPr>
+              <a:t>Github</a:t>
+            </a:r>
+            <a:r>
+              <a:rPr lang="de-DE" dirty="0">
+                <a:hlinkClick r:id="rId2"/>
+              </a:rPr>
+              <a:t> Cloud</a:t>
+            </a:r>
+            <a:endParaRPr lang="de-DE" dirty="0"/>
+          </a:p>
+          <a:p>
+            <a:r>
+              <a:rPr lang="de-DE" dirty="0"/>
               <a:t>Deploy auf </a:t>
             </a:r>
             <a:r>
-              <a:rPr lang="de-DE" dirty="0" err="1"/>
+              <a:rPr lang="de-DE" dirty="0" err="1">
+                <a:hlinkClick r:id="rId3"/>
+              </a:rPr>
               <a:t>Github</a:t>
             </a:r>
             <a:r>
+              <a:rPr lang="de-DE" dirty="0">
+                <a:hlinkClick r:id="rId3"/>
+              </a:rPr>
+              <a:t>-Pages</a:t>
+            </a:r>
+            <a:r>
               <a:rPr lang="de-DE" dirty="0"/>
-              <a:t>-Pages (Public)</a:t>
+              <a:t> (Public)</a:t>
             </a:r>
           </a:p>
           <a:p>
@@ -8401,7 +8455,10 @@
               <a:rPr lang="de-DE" dirty="0" err="1"/>
               <a:t>wago.free.wifi</a:t>
             </a:r>
-            <a:endParaRPr lang="de-DE" dirty="0"/>
+            <a:r>
+              <a:rPr lang="de-DE" dirty="0"/>
+              <a:t> (ggf. QR-Code dafür?!)</a:t>
+            </a:r>
           </a:p>
         </p:txBody>
       </p:sp>
@@ -8465,6 +8522,44 @@
           </a:prstGeom>
         </p:spPr>
       </p:pic>
+      <p:sp>
+        <p:nvSpPr>
+          <p:cNvPr id="2" name="Textfeld 1">
+            <a:extLst>
+              <a:ext uri="{FF2B5EF4-FFF2-40B4-BE49-F238E27FC236}">
+                <a16:creationId xmlns:a16="http://schemas.microsoft.com/office/drawing/2014/main" id="{29F0D2FF-399F-B96F-A9E1-06411514C1C7}"/>
+              </a:ext>
+            </a:extLst>
+          </p:cNvPr>
+          <p:cNvSpPr txBox="1"/>
+          <p:nvPr/>
+        </p:nvSpPr>
+        <p:spPr>
+          <a:xfrm>
+            <a:off x="224589" y="224590"/>
+            <a:ext cx="2141621" cy="646331"/>
+          </a:xfrm>
+          <a:prstGeom prst="rect">
+            <a:avLst/>
+          </a:prstGeom>
+          <a:noFill/>
+        </p:spPr>
+        <p:txBody>
+          <a:bodyPr wrap="square" rtlCol="0">
+            <a:spAutoFit/>
+          </a:bodyPr>
+          <a:lstStyle/>
+          <a:p>
+            <a:r>
+              <a:rPr lang="de-DE" dirty="0">
+                <a:hlinkClick r:id="rId3"/>
+              </a:rPr>
+              <a:t>Lageplan Ausbildungszentrum</a:t>
+            </a:r>
+            <a:endParaRPr lang="de-DE" dirty="0"/>
+          </a:p>
+        </p:txBody>
+      </p:sp>
     </p:spTree>
     <p:extLst>
       <p:ext uri="{BB962C8B-B14F-4D97-AF65-F5344CB8AC3E}">
@@ -12227,6 +12322,44 @@
           </a:fontRef>
         </p:style>
       </p:cxnSp>
+      <p:sp>
+        <p:nvSpPr>
+          <p:cNvPr id="4" name="Textfeld 3">
+            <a:extLst>
+              <a:ext uri="{FF2B5EF4-FFF2-40B4-BE49-F238E27FC236}">
+                <a16:creationId xmlns:a16="http://schemas.microsoft.com/office/drawing/2014/main" id="{99D6F540-8056-95F6-5D80-34D83A55A612}"/>
+              </a:ext>
+            </a:extLst>
+          </p:cNvPr>
+          <p:cNvSpPr txBox="1"/>
+          <p:nvPr/>
+        </p:nvSpPr>
+        <p:spPr>
+          <a:xfrm>
+            <a:off x="224589" y="224590"/>
+            <a:ext cx="2141621" cy="646331"/>
+          </a:xfrm>
+          <a:prstGeom prst="rect">
+            <a:avLst/>
+          </a:prstGeom>
+          <a:noFill/>
+        </p:spPr>
+        <p:txBody>
+          <a:bodyPr wrap="square" rtlCol="0">
+            <a:spAutoFit/>
+          </a:bodyPr>
+          <a:lstStyle/>
+          <a:p>
+            <a:r>
+              <a:rPr lang="de-DE" dirty="0">
+                <a:hlinkClick r:id="rId3"/>
+              </a:rPr>
+              <a:t>Lageplan Ausbildungszentrum</a:t>
+            </a:r>
+            <a:endParaRPr lang="de-DE" dirty="0"/>
+          </a:p>
+        </p:txBody>
+      </p:sp>
     </p:spTree>
     <p:extLst>
       <p:ext uri="{BB962C8B-B14F-4D97-AF65-F5344CB8AC3E}">
@@ -18674,8 +18807,15 @@
           <a:p>
             <a:r>
               <a:rPr lang="de-DE" dirty="0"/>
-              <a:t>Farbauswahl; Auszug aus dem WAGO-Katalog für Automation</a:t>
+              <a:t>Farbauswahl; Auszug aus dem </a:t>
             </a:r>
+            <a:r>
+              <a:rPr lang="de-DE" dirty="0">
+                <a:hlinkClick r:id="rId3"/>
+              </a:rPr>
+              <a:t>WAGO-Katalog für Automation</a:t>
+            </a:r>
+            <a:endParaRPr lang="de-DE" dirty="0"/>
           </a:p>
         </p:txBody>
       </p:sp>

</xml_diff>

<commit_message>
(DOC) update map, remove unused, doc
</commit_message>
<xml_diff>
--- a/Website_TdA_2024.pptx
+++ b/Website_TdA_2024.pptx
@@ -133,7 +133,7 @@
 <file path=ppt/revisionInfo.xml><?xml version="1.0" encoding="utf-8"?>
 <p1510:revInfo xmlns:a="http://schemas.openxmlformats.org/drawingml/2006/main" xmlns:r="http://schemas.openxmlformats.org/officeDocument/2006/relationships" xmlns:p1510="http://schemas.microsoft.com/office/powerpoint/2015/10/main">
   <p1510:revLst>
-    <p1510:client id="{96D7FF0F-B081-4A9D-BD68-D3EBAC727EF5}" v="211" dt="2024-02-13T08:27:33.621"/>
+    <p1510:client id="{96D7FF0F-B081-4A9D-BD68-D3EBAC727EF5}" v="215" dt="2024-02-13T10:04:16.026"/>
   </p1510:revLst>
 </p1510:revInfo>
 </file>
@@ -143,7 +143,7 @@
   <pc:docChgLst>
     <pc:chgData name="Stapel, Frederic" userId="1abc07cd-784c-4ede-87bc-7246762e1d08" providerId="ADAL" clId="{96D7FF0F-B081-4A9D-BD68-D3EBAC727EF5}"/>
     <pc:docChg chg="undo redo custSel addSld delSld modSld sldOrd">
-      <pc:chgData name="Stapel, Frederic" userId="1abc07cd-784c-4ede-87bc-7246762e1d08" providerId="ADAL" clId="{96D7FF0F-B081-4A9D-BD68-D3EBAC727EF5}" dt="2024-02-13T08:27:11.672" v="3994" actId="20577"/>
+      <pc:chgData name="Stapel, Frederic" userId="1abc07cd-784c-4ede-87bc-7246762e1d08" providerId="ADAL" clId="{96D7FF0F-B081-4A9D-BD68-D3EBAC727EF5}" dt="2024-02-13T10:05:53.810" v="4180" actId="20577"/>
       <pc:docMkLst>
         <pc:docMk/>
       </pc:docMkLst>
@@ -1704,11 +1704,19 @@
         </pc:picChg>
       </pc:sldChg>
       <pc:sldChg chg="addSp delSp modSp add mod modNotesTx">
-        <pc:chgData name="Stapel, Frederic" userId="1abc07cd-784c-4ede-87bc-7246762e1d08" providerId="ADAL" clId="{96D7FF0F-B081-4A9D-BD68-D3EBAC727EF5}" dt="2024-02-07T12:46:01.414" v="3886" actId="1076"/>
+        <pc:chgData name="Stapel, Frederic" userId="1abc07cd-784c-4ede-87bc-7246762e1d08" providerId="ADAL" clId="{96D7FF0F-B081-4A9D-BD68-D3EBAC727EF5}" dt="2024-02-13T10:05:53.810" v="4180" actId="20577"/>
         <pc:sldMkLst>
           <pc:docMk/>
           <pc:sldMk cId="459294818" sldId="274"/>
         </pc:sldMkLst>
+        <pc:spChg chg="add mod">
+          <ac:chgData name="Stapel, Frederic" userId="1abc07cd-784c-4ede-87bc-7246762e1d08" providerId="ADAL" clId="{96D7FF0F-B081-4A9D-BD68-D3EBAC727EF5}" dt="2024-02-13T10:05:40.849" v="4175" actId="14100"/>
+          <ac:spMkLst>
+            <pc:docMk/>
+            <pc:sldMk cId="459294818" sldId="274"/>
+            <ac:spMk id="2" creationId="{1DAC0F08-B900-7188-34CC-B2718E8582A5}"/>
+          </ac:spMkLst>
+        </pc:spChg>
         <pc:spChg chg="add del mod">
           <ac:chgData name="Stapel, Frederic" userId="1abc07cd-784c-4ede-87bc-7246762e1d08" providerId="ADAL" clId="{96D7FF0F-B081-4A9D-BD68-D3EBAC727EF5}" dt="2024-02-07T09:54:07.739" v="2587" actId="478"/>
           <ac:spMkLst>
@@ -1726,6 +1734,14 @@
           </ac:spMkLst>
         </pc:spChg>
         <pc:spChg chg="add del mod">
+          <ac:chgData name="Stapel, Frederic" userId="1abc07cd-784c-4ede-87bc-7246762e1d08" providerId="ADAL" clId="{96D7FF0F-B081-4A9D-BD68-D3EBAC727EF5}" dt="2024-02-13T10:04:03.506" v="4169" actId="478"/>
+          <ac:spMkLst>
+            <pc:docMk/>
+            <pc:sldMk cId="459294818" sldId="274"/>
+            <ac:spMk id="10" creationId="{094ACB5F-4F1C-A3E6-2623-CA8909773B01}"/>
+          </ac:spMkLst>
+        </pc:spChg>
+        <pc:spChg chg="add del mod">
           <ac:chgData name="Stapel, Frederic" userId="1abc07cd-784c-4ede-87bc-7246762e1d08" providerId="ADAL" clId="{96D7FF0F-B081-4A9D-BD68-D3EBAC727EF5}" dt="2024-02-07T09:45:25.543" v="2499" actId="478"/>
           <ac:spMkLst>
             <pc:docMk/>
@@ -1877,8 +1893,8 @@
             <ac:spMk id="38" creationId="{79F88E2C-0694-8198-3CAF-21385E3DDC9C}"/>
           </ac:spMkLst>
         </pc:spChg>
-        <pc:spChg chg="add mod">
-          <ac:chgData name="Stapel, Frederic" userId="1abc07cd-784c-4ede-87bc-7246762e1d08" providerId="ADAL" clId="{96D7FF0F-B081-4A9D-BD68-D3EBAC727EF5}" dt="2024-02-07T10:16:07.612" v="2921" actId="207"/>
+        <pc:spChg chg="add del mod">
+          <ac:chgData name="Stapel, Frederic" userId="1abc07cd-784c-4ede-87bc-7246762e1d08" providerId="ADAL" clId="{96D7FF0F-B081-4A9D-BD68-D3EBAC727EF5}" dt="2024-02-13T09:11:01.818" v="4077" actId="478"/>
           <ac:spMkLst>
             <pc:docMk/>
             <pc:sldMk cId="459294818" sldId="274"/>
@@ -1886,7 +1902,7 @@
           </ac:spMkLst>
         </pc:spChg>
         <pc:spChg chg="add mod">
-          <ac:chgData name="Stapel, Frederic" userId="1abc07cd-784c-4ede-87bc-7246762e1d08" providerId="ADAL" clId="{96D7FF0F-B081-4A9D-BD68-D3EBAC727EF5}" dt="2024-02-07T10:16:07.612" v="2921" actId="207"/>
+          <ac:chgData name="Stapel, Frederic" userId="1abc07cd-784c-4ede-87bc-7246762e1d08" providerId="ADAL" clId="{96D7FF0F-B081-4A9D-BD68-D3EBAC727EF5}" dt="2024-02-13T09:11:11.839" v="4079" actId="207"/>
           <ac:spMkLst>
             <pc:docMk/>
             <pc:sldMk cId="459294818" sldId="274"/>
@@ -1894,15 +1910,15 @@
           </ac:spMkLst>
         </pc:spChg>
         <pc:spChg chg="add mod">
-          <ac:chgData name="Stapel, Frederic" userId="1abc07cd-784c-4ede-87bc-7246762e1d08" providerId="ADAL" clId="{96D7FF0F-B081-4A9D-BD68-D3EBAC727EF5}" dt="2024-02-07T10:16:07.612" v="2921" actId="207"/>
+          <ac:chgData name="Stapel, Frederic" userId="1abc07cd-784c-4ede-87bc-7246762e1d08" providerId="ADAL" clId="{96D7FF0F-B081-4A9D-BD68-D3EBAC727EF5}" dt="2024-02-13T09:50:17.143" v="4153" actId="14100"/>
           <ac:spMkLst>
             <pc:docMk/>
             <pc:sldMk cId="459294818" sldId="274"/>
             <ac:spMk id="44" creationId="{EC2FA0C8-F00D-B447-ABFD-A7CB45A08D4D}"/>
           </ac:spMkLst>
         </pc:spChg>
-        <pc:spChg chg="add mod">
-          <ac:chgData name="Stapel, Frederic" userId="1abc07cd-784c-4ede-87bc-7246762e1d08" providerId="ADAL" clId="{96D7FF0F-B081-4A9D-BD68-D3EBAC727EF5}" dt="2024-02-07T10:16:07.612" v="2921" actId="207"/>
+        <pc:spChg chg="add del mod">
+          <ac:chgData name="Stapel, Frederic" userId="1abc07cd-784c-4ede-87bc-7246762e1d08" providerId="ADAL" clId="{96D7FF0F-B081-4A9D-BD68-D3EBAC727EF5}" dt="2024-02-13T09:50:12.280" v="4152" actId="478"/>
           <ac:spMkLst>
             <pc:docMk/>
             <pc:sldMk cId="459294818" sldId="274"/>
@@ -1918,7 +1934,7 @@
           </ac:spMkLst>
         </pc:spChg>
         <pc:spChg chg="add mod">
-          <ac:chgData name="Stapel, Frederic" userId="1abc07cd-784c-4ede-87bc-7246762e1d08" providerId="ADAL" clId="{96D7FF0F-B081-4A9D-BD68-D3EBAC727EF5}" dt="2024-02-07T10:16:07.612" v="2921" actId="207"/>
+          <ac:chgData name="Stapel, Frederic" userId="1abc07cd-784c-4ede-87bc-7246762e1d08" providerId="ADAL" clId="{96D7FF0F-B081-4A9D-BD68-D3EBAC727EF5}" dt="2024-02-13T09:09:13.568" v="4023" actId="207"/>
           <ac:spMkLst>
             <pc:docMk/>
             <pc:sldMk cId="459294818" sldId="274"/>
@@ -1942,7 +1958,7 @@
           </ac:spMkLst>
         </pc:spChg>
         <pc:spChg chg="add mod">
-          <ac:chgData name="Stapel, Frederic" userId="1abc07cd-784c-4ede-87bc-7246762e1d08" providerId="ADAL" clId="{96D7FF0F-B081-4A9D-BD68-D3EBAC727EF5}" dt="2024-02-07T10:16:07.612" v="2921" actId="207"/>
+          <ac:chgData name="Stapel, Frederic" userId="1abc07cd-784c-4ede-87bc-7246762e1d08" providerId="ADAL" clId="{96D7FF0F-B081-4A9D-BD68-D3EBAC727EF5}" dt="2024-02-13T09:13:18.128" v="4082" actId="207"/>
           <ac:spMkLst>
             <pc:docMk/>
             <pc:sldMk cId="459294818" sldId="274"/>
@@ -1973,8 +1989,8 @@
             <ac:spMk id="58" creationId="{FA182DDA-6C39-6FF2-5BFF-1FFA3B1C7280}"/>
           </ac:spMkLst>
         </pc:spChg>
-        <pc:spChg chg="add mod">
-          <ac:chgData name="Stapel, Frederic" userId="1abc07cd-784c-4ede-87bc-7246762e1d08" providerId="ADAL" clId="{96D7FF0F-B081-4A9D-BD68-D3EBAC727EF5}" dt="2024-02-07T10:22:58.521" v="2980" actId="1076"/>
+        <pc:spChg chg="add del mod">
+          <ac:chgData name="Stapel, Frederic" userId="1abc07cd-784c-4ede-87bc-7246762e1d08" providerId="ADAL" clId="{96D7FF0F-B081-4A9D-BD68-D3EBAC727EF5}" dt="2024-02-13T09:10:32.925" v="4051" actId="478"/>
           <ac:spMkLst>
             <pc:docMk/>
             <pc:sldMk cId="459294818" sldId="274"/>
@@ -1982,7 +1998,7 @@
           </ac:spMkLst>
         </pc:spChg>
         <pc:spChg chg="add mod">
-          <ac:chgData name="Stapel, Frederic" userId="1abc07cd-784c-4ede-87bc-7246762e1d08" providerId="ADAL" clId="{96D7FF0F-B081-4A9D-BD68-D3EBAC727EF5}" dt="2024-02-07T10:22:34.928" v="2974" actId="1076"/>
+          <ac:chgData name="Stapel, Frederic" userId="1abc07cd-784c-4ede-87bc-7246762e1d08" providerId="ADAL" clId="{96D7FF0F-B081-4A9D-BD68-D3EBAC727EF5}" dt="2024-02-13T09:11:21.658" v="4080" actId="1076"/>
           <ac:spMkLst>
             <pc:docMk/>
             <pc:sldMk cId="459294818" sldId="274"/>
@@ -1990,15 +2006,15 @@
           </ac:spMkLst>
         </pc:spChg>
         <pc:spChg chg="add mod">
-          <ac:chgData name="Stapel, Frederic" userId="1abc07cd-784c-4ede-87bc-7246762e1d08" providerId="ADAL" clId="{96D7FF0F-B081-4A9D-BD68-D3EBAC727EF5}" dt="2024-02-07T10:23:50.425" v="3038" actId="20577"/>
+          <ac:chgData name="Stapel, Frederic" userId="1abc07cd-784c-4ede-87bc-7246762e1d08" providerId="ADAL" clId="{96D7FF0F-B081-4A9D-BD68-D3EBAC727EF5}" dt="2024-02-13T09:50:24.810" v="4155" actId="6549"/>
           <ac:spMkLst>
             <pc:docMk/>
             <pc:sldMk cId="459294818" sldId="274"/>
             <ac:spMk id="64" creationId="{796F748F-5F07-7497-08C0-6BADB8CDCB0C}"/>
           </ac:spMkLst>
         </pc:spChg>
-        <pc:spChg chg="add mod">
-          <ac:chgData name="Stapel, Frederic" userId="1abc07cd-784c-4ede-87bc-7246762e1d08" providerId="ADAL" clId="{96D7FF0F-B081-4A9D-BD68-D3EBAC727EF5}" dt="2024-02-07T10:24:13.680" v="3074" actId="1076"/>
+        <pc:spChg chg="add del mod">
+          <ac:chgData name="Stapel, Frederic" userId="1abc07cd-784c-4ede-87bc-7246762e1d08" providerId="ADAL" clId="{96D7FF0F-B081-4A9D-BD68-D3EBAC727EF5}" dt="2024-02-13T09:09:39.855" v="4025" actId="478"/>
           <ac:spMkLst>
             <pc:docMk/>
             <pc:sldMk cId="459294818" sldId="274"/>
@@ -2006,7 +2022,7 @@
           </ac:spMkLst>
         </pc:spChg>
         <pc:spChg chg="add mod">
-          <ac:chgData name="Stapel, Frederic" userId="1abc07cd-784c-4ede-87bc-7246762e1d08" providerId="ADAL" clId="{96D7FF0F-B081-4A9D-BD68-D3EBAC727EF5}" dt="2024-02-07T10:24:30.785" v="3098" actId="1076"/>
+          <ac:chgData name="Stapel, Frederic" userId="1abc07cd-784c-4ede-87bc-7246762e1d08" providerId="ADAL" clId="{96D7FF0F-B081-4A9D-BD68-D3EBAC727EF5}" dt="2024-02-13T09:10:05.818" v="4049" actId="20577"/>
           <ac:spMkLst>
             <pc:docMk/>
             <pc:sldMk cId="459294818" sldId="274"/>
@@ -2014,7 +2030,7 @@
           </ac:spMkLst>
         </pc:spChg>
         <pc:spChg chg="add mod">
-          <ac:chgData name="Stapel, Frederic" userId="1abc07cd-784c-4ede-87bc-7246762e1d08" providerId="ADAL" clId="{96D7FF0F-B081-4A9D-BD68-D3EBAC727EF5}" dt="2024-02-07T10:35:23.781" v="3420" actId="20577"/>
+          <ac:chgData name="Stapel, Frederic" userId="1abc07cd-784c-4ede-87bc-7246762e1d08" providerId="ADAL" clId="{96D7FF0F-B081-4A9D-BD68-D3EBAC727EF5}" dt="2024-02-13T10:05:44.152" v="4176" actId="20577"/>
           <ac:spMkLst>
             <pc:docMk/>
             <pc:sldMk cId="459294818" sldId="274"/>
@@ -2022,7 +2038,7 @@
           </ac:spMkLst>
         </pc:spChg>
         <pc:spChg chg="add mod">
-          <ac:chgData name="Stapel, Frederic" userId="1abc07cd-784c-4ede-87bc-7246762e1d08" providerId="ADAL" clId="{96D7FF0F-B081-4A9D-BD68-D3EBAC727EF5}" dt="2024-02-07T10:32:03.692" v="3392" actId="1076"/>
+          <ac:chgData name="Stapel, Frederic" userId="1abc07cd-784c-4ede-87bc-7246762e1d08" providerId="ADAL" clId="{96D7FF0F-B081-4A9D-BD68-D3EBAC727EF5}" dt="2024-02-13T10:05:53.810" v="4180" actId="20577"/>
           <ac:spMkLst>
             <pc:docMk/>
             <pc:sldMk cId="459294818" sldId="274"/>
@@ -2038,7 +2054,7 @@
           </ac:spMkLst>
         </pc:spChg>
         <pc:spChg chg="add mod ord">
-          <ac:chgData name="Stapel, Frederic" userId="1abc07cd-784c-4ede-87bc-7246762e1d08" providerId="ADAL" clId="{96D7FF0F-B081-4A9D-BD68-D3EBAC727EF5}" dt="2024-02-07T12:02:26.519" v="3876" actId="1076"/>
+          <ac:chgData name="Stapel, Frederic" userId="1abc07cd-784c-4ede-87bc-7246762e1d08" providerId="ADAL" clId="{96D7FF0F-B081-4A9D-BD68-D3EBAC727EF5}" dt="2024-02-13T09:51:24.943" v="4160" actId="1076"/>
           <ac:spMkLst>
             <pc:docMk/>
             <pc:sldMk cId="459294818" sldId="274"/>
@@ -2142,7 +2158,7 @@
           </ac:picMkLst>
         </pc:picChg>
         <pc:picChg chg="add mod">
-          <ac:chgData name="Stapel, Frederic" userId="1abc07cd-784c-4ede-87bc-7246762e1d08" providerId="ADAL" clId="{96D7FF0F-B081-4A9D-BD68-D3EBAC727EF5}" dt="2024-02-07T12:45:57.952" v="3885" actId="1076"/>
+          <ac:chgData name="Stapel, Frederic" userId="1abc07cd-784c-4ede-87bc-7246762e1d08" providerId="ADAL" clId="{96D7FF0F-B081-4A9D-BD68-D3EBAC727EF5}" dt="2024-02-13T09:51:42.527" v="4161" actId="1076"/>
           <ac:picMkLst>
             <pc:docMk/>
             <pc:sldMk cId="459294818" sldId="274"/>
@@ -2166,19 +2182,43 @@
           </ac:picMkLst>
         </pc:picChg>
         <pc:picChg chg="add mod">
-          <ac:chgData name="Stapel, Frederic" userId="1abc07cd-784c-4ede-87bc-7246762e1d08" providerId="ADAL" clId="{96D7FF0F-B081-4A9D-BD68-D3EBAC727EF5}" dt="2024-02-07T12:45:54.360" v="3883" actId="1076"/>
+          <ac:chgData name="Stapel, Frederic" userId="1abc07cd-784c-4ede-87bc-7246762e1d08" providerId="ADAL" clId="{96D7FF0F-B081-4A9D-BD68-D3EBAC727EF5}" dt="2024-02-13T09:52:04.079" v="4163" actId="1076"/>
           <ac:picMkLst>
             <pc:docMk/>
             <pc:sldMk cId="459294818" sldId="274"/>
             <ac:picMk id="98" creationId="{CAC8E3A7-DA80-02D5-127E-7C96C7362F83}"/>
           </ac:picMkLst>
         </pc:picChg>
+        <pc:cxnChg chg="add mod">
+          <ac:chgData name="Stapel, Frederic" userId="1abc07cd-784c-4ede-87bc-7246762e1d08" providerId="ADAL" clId="{96D7FF0F-B081-4A9D-BD68-D3EBAC727EF5}" dt="2024-02-13T10:04:25.545" v="4173" actId="14100"/>
+          <ac:cxnSpMkLst>
+            <pc:docMk/>
+            <pc:sldMk cId="459294818" sldId="274"/>
+            <ac:cxnSpMk id="20" creationId="{82E1057E-61EA-591F-E268-17D10D0ED1BB}"/>
+          </ac:cxnSpMkLst>
+        </pc:cxnChg>
         <pc:cxnChg chg="mod">
-          <ac:chgData name="Stapel, Frederic" userId="1abc07cd-784c-4ede-87bc-7246762e1d08" providerId="ADAL" clId="{96D7FF0F-B081-4A9D-BD68-D3EBAC727EF5}" dt="2024-02-07T09:30:38.484" v="2474" actId="1076"/>
+          <ac:chgData name="Stapel, Frederic" userId="1abc07cd-784c-4ede-87bc-7246762e1d08" providerId="ADAL" clId="{96D7FF0F-B081-4A9D-BD68-D3EBAC727EF5}" dt="2024-02-13T09:50:34.145" v="4156" actId="14100"/>
+          <ac:cxnSpMkLst>
+            <pc:docMk/>
+            <pc:sldMk cId="459294818" sldId="274"/>
+            <ac:cxnSpMk id="111" creationId="{9EB0980A-C117-731F-914B-B3BC7663EEA5}"/>
+          </ac:cxnSpMkLst>
+        </pc:cxnChg>
+        <pc:cxnChg chg="mod">
+          <ac:chgData name="Stapel, Frederic" userId="1abc07cd-784c-4ede-87bc-7246762e1d08" providerId="ADAL" clId="{96D7FF0F-B081-4A9D-BD68-D3EBAC727EF5}" dt="2024-02-13T10:04:10.660" v="4170" actId="14100"/>
           <ac:cxnSpMkLst>
             <pc:docMk/>
             <pc:sldMk cId="459294818" sldId="274"/>
             <ac:cxnSpMk id="121" creationId="{5004A604-AE84-BA07-A194-C78F746F6203}"/>
+          </ac:cxnSpMkLst>
+        </pc:cxnChg>
+        <pc:cxnChg chg="del">
+          <ac:chgData name="Stapel, Frederic" userId="1abc07cd-784c-4ede-87bc-7246762e1d08" providerId="ADAL" clId="{96D7FF0F-B081-4A9D-BD68-D3EBAC727EF5}" dt="2024-02-13T09:09:21.806" v="4024" actId="478"/>
+          <ac:cxnSpMkLst>
+            <pc:docMk/>
+            <pc:sldMk cId="459294818" sldId="274"/>
+            <ac:cxnSpMk id="133" creationId="{55F08750-2D40-7EDD-3A64-3DF116D43DD4}"/>
           </ac:cxnSpMkLst>
         </pc:cxnChg>
         <pc:cxnChg chg="mod">
@@ -14423,9 +14463,9 @@
           <p:nvPr/>
         </p:nvCxnSpPr>
         <p:spPr>
-          <a:xfrm>
-            <a:off x="4110824" y="4031311"/>
-            <a:ext cx="7953" cy="152400"/>
+          <a:xfrm flipH="1">
+            <a:off x="4110823" y="4031311"/>
+            <a:ext cx="1" cy="166823"/>
           </a:xfrm>
           <a:prstGeom prst="line">
             <a:avLst/>
@@ -14597,7 +14637,7 @@
         <p:spPr>
           <a:xfrm flipV="1">
             <a:off x="5110036" y="1436205"/>
-            <a:ext cx="0" cy="1012797"/>
+            <a:ext cx="0" cy="794965"/>
           </a:xfrm>
           <a:prstGeom prst="line">
             <a:avLst/>
@@ -14726,49 +14766,6 @@
         <p:spPr>
           <a:xfrm>
             <a:off x="4110824" y="3135133"/>
-            <a:ext cx="683811" cy="0"/>
-          </a:xfrm>
-          <a:prstGeom prst="line">
-            <a:avLst/>
-          </a:prstGeom>
-          <a:ln w="28575">
-            <a:solidFill>
-              <a:srgbClr val="7EC635"/>
-            </a:solidFill>
-          </a:ln>
-        </p:spPr>
-        <p:style>
-          <a:lnRef idx="1">
-            <a:schemeClr val="accent1"/>
-          </a:lnRef>
-          <a:fillRef idx="0">
-            <a:schemeClr val="accent1"/>
-          </a:fillRef>
-          <a:effectRef idx="0">
-            <a:schemeClr val="accent1"/>
-          </a:effectRef>
-          <a:fontRef idx="minor">
-            <a:schemeClr val="tx1"/>
-          </a:fontRef>
-        </p:style>
-      </p:cxnSp>
-      <p:cxnSp>
-        <p:nvCxnSpPr>
-          <p:cNvPr id="133" name="Gerader Verbinder 132">
-            <a:extLst>
-              <a:ext uri="{FF2B5EF4-FFF2-40B4-BE49-F238E27FC236}">
-                <a16:creationId xmlns:a16="http://schemas.microsoft.com/office/drawing/2014/main" id="{55F08750-2D40-7EDD-3A64-3DF116D43DD4}"/>
-              </a:ext>
-            </a:extLst>
-          </p:cNvPr>
-          <p:cNvCxnSpPr>
-            <a:cxnSpLocks/>
-          </p:cNvCxnSpPr>
-          <p:nvPr/>
-        </p:nvCxnSpPr>
-        <p:spPr>
-          <a:xfrm>
-            <a:off x="4118777" y="3496255"/>
             <a:ext cx="683811" cy="0"/>
           </a:xfrm>
           <a:prstGeom prst="line">
@@ -17344,10 +17341,10 @@
       </p:sp>
       <p:sp>
         <p:nvSpPr>
-          <p:cNvPr id="40" name="Rechteck 39">
-            <a:extLst>
-              <a:ext uri="{FF2B5EF4-FFF2-40B4-BE49-F238E27FC236}">
-                <a16:creationId xmlns:a16="http://schemas.microsoft.com/office/drawing/2014/main" id="{74451B0E-4D0D-7579-00A1-C8953959F170}"/>
+          <p:cNvPr id="43" name="Rechteck 42">
+            <a:extLst>
+              <a:ext uri="{FF2B5EF4-FFF2-40B4-BE49-F238E27FC236}">
+                <a16:creationId xmlns:a16="http://schemas.microsoft.com/office/drawing/2014/main" id="{1B09FA5A-F7DB-4131-0036-80183B2184D2}"/>
               </a:ext>
             </a:extLst>
           </p:cNvPr>
@@ -17356,8 +17353,62 @@
         </p:nvSpPr>
         <p:spPr>
           <a:xfrm>
-            <a:off x="6154046" y="1622952"/>
-            <a:ext cx="652270" cy="291987"/>
+            <a:off x="6826925" y="1626392"/>
+            <a:ext cx="633387" cy="291987"/>
+          </a:xfrm>
+          <a:prstGeom prst="rect">
+            <a:avLst/>
+          </a:prstGeom>
+          <a:solidFill>
+            <a:srgbClr val="E4F0D5">
+              <a:alpha val="80000"/>
+            </a:srgbClr>
+          </a:solidFill>
+          <a:ln>
+            <a:noFill/>
+          </a:ln>
+        </p:spPr>
+        <p:style>
+          <a:lnRef idx="2">
+            <a:schemeClr val="accent1">
+              <a:shade val="15000"/>
+            </a:schemeClr>
+          </a:lnRef>
+          <a:fillRef idx="1">
+            <a:schemeClr val="accent1"/>
+          </a:fillRef>
+          <a:effectRef idx="0">
+            <a:schemeClr val="accent1"/>
+          </a:effectRef>
+          <a:fontRef idx="minor">
+            <a:schemeClr val="lt1"/>
+          </a:fontRef>
+        </p:style>
+        <p:txBody>
+          <a:bodyPr rtlCol="0" anchor="ctr"/>
+          <a:lstStyle/>
+          <a:p>
+            <a:pPr algn="ctr"/>
+            <a:endParaRPr lang="de-DE"/>
+          </a:p>
+        </p:txBody>
+      </p:sp>
+      <p:sp>
+        <p:nvSpPr>
+          <p:cNvPr id="44" name="Rechteck 43">
+            <a:extLst>
+              <a:ext uri="{FF2B5EF4-FFF2-40B4-BE49-F238E27FC236}">
+                <a16:creationId xmlns:a16="http://schemas.microsoft.com/office/drawing/2014/main" id="{EC2FA0C8-F00D-B447-ABFD-A7CB45A08D4D}"/>
+              </a:ext>
+            </a:extLst>
+          </p:cNvPr>
+          <p:cNvSpPr/>
+          <p:nvPr/>
+        </p:nvSpPr>
+        <p:spPr>
+          <a:xfrm>
+            <a:off x="4123207" y="3144084"/>
+            <a:ext cx="671086" cy="653155"/>
           </a:xfrm>
           <a:prstGeom prst="rect">
             <a:avLst/>
@@ -17398,10 +17449,10 @@
       </p:sp>
       <p:sp>
         <p:nvSpPr>
-          <p:cNvPr id="43" name="Rechteck 42">
-            <a:extLst>
-              <a:ext uri="{FF2B5EF4-FFF2-40B4-BE49-F238E27FC236}">
-                <a16:creationId xmlns:a16="http://schemas.microsoft.com/office/drawing/2014/main" id="{1B09FA5A-F7DB-4131-0036-80183B2184D2}"/>
+          <p:cNvPr id="47" name="Rechteck 46">
+            <a:extLst>
+              <a:ext uri="{FF2B5EF4-FFF2-40B4-BE49-F238E27FC236}">
+                <a16:creationId xmlns:a16="http://schemas.microsoft.com/office/drawing/2014/main" id="{99F0F0FE-59A1-2FB0-5C69-A2C7DB44C1CD}"/>
               </a:ext>
             </a:extLst>
           </p:cNvPr>
@@ -17410,62 +17461,8 @@
         </p:nvSpPr>
         <p:spPr>
           <a:xfrm>
-            <a:off x="6826925" y="1626392"/>
-            <a:ext cx="633387" cy="291987"/>
-          </a:xfrm>
-          <a:prstGeom prst="rect">
-            <a:avLst/>
-          </a:prstGeom>
-          <a:solidFill>
-            <a:srgbClr val="85C695">
-              <a:alpha val="80000"/>
-            </a:srgbClr>
-          </a:solidFill>
-          <a:ln>
-            <a:noFill/>
-          </a:ln>
-        </p:spPr>
-        <p:style>
-          <a:lnRef idx="2">
-            <a:schemeClr val="accent1">
-              <a:shade val="15000"/>
-            </a:schemeClr>
-          </a:lnRef>
-          <a:fillRef idx="1">
-            <a:schemeClr val="accent1"/>
-          </a:fillRef>
-          <a:effectRef idx="0">
-            <a:schemeClr val="accent1"/>
-          </a:effectRef>
-          <a:fontRef idx="minor">
-            <a:schemeClr val="lt1"/>
-          </a:fontRef>
-        </p:style>
-        <p:txBody>
-          <a:bodyPr rtlCol="0" anchor="ctr"/>
-          <a:lstStyle/>
-          <a:p>
-            <a:pPr algn="ctr"/>
-            <a:endParaRPr lang="de-DE"/>
-          </a:p>
-        </p:txBody>
-      </p:sp>
-      <p:sp>
-        <p:nvSpPr>
-          <p:cNvPr id="44" name="Rechteck 43">
-            <a:extLst>
-              <a:ext uri="{FF2B5EF4-FFF2-40B4-BE49-F238E27FC236}">
-                <a16:creationId xmlns:a16="http://schemas.microsoft.com/office/drawing/2014/main" id="{EC2FA0C8-F00D-B447-ABFD-A7CB45A08D4D}"/>
-              </a:ext>
-            </a:extLst>
-          </p:cNvPr>
-          <p:cNvSpPr/>
-          <p:nvPr/>
-        </p:nvSpPr>
-        <p:spPr>
-          <a:xfrm>
-            <a:off x="4123207" y="3144085"/>
-            <a:ext cx="671086" cy="344542"/>
+            <a:off x="4124543" y="3820112"/>
+            <a:ext cx="671086" cy="198212"/>
           </a:xfrm>
           <a:prstGeom prst="rect">
             <a:avLst/>
@@ -17506,10 +17503,10 @@
       </p:sp>
       <p:sp>
         <p:nvSpPr>
-          <p:cNvPr id="46" name="Rechteck 45">
-            <a:extLst>
-              <a:ext uri="{FF2B5EF4-FFF2-40B4-BE49-F238E27FC236}">
-                <a16:creationId xmlns:a16="http://schemas.microsoft.com/office/drawing/2014/main" id="{44CB937A-41E9-A1AD-BAD8-E1C1A5590E3A}"/>
+          <p:cNvPr id="49" name="Rechteck 48">
+            <a:extLst>
+              <a:ext uri="{FF2B5EF4-FFF2-40B4-BE49-F238E27FC236}">
+                <a16:creationId xmlns:a16="http://schemas.microsoft.com/office/drawing/2014/main" id="{B4D17CA4-AF39-C0AA-725D-B74322FC9648}"/>
               </a:ext>
             </a:extLst>
           </p:cNvPr>
@@ -17518,8 +17515,8 @@
         </p:nvSpPr>
         <p:spPr>
           <a:xfrm>
-            <a:off x="4125310" y="3508140"/>
-            <a:ext cx="671086" cy="291583"/>
+            <a:off x="4125340" y="2771981"/>
+            <a:ext cx="676413" cy="349234"/>
           </a:xfrm>
           <a:prstGeom prst="rect">
             <a:avLst/>
@@ -17560,10 +17557,10 @@
       </p:sp>
       <p:sp>
         <p:nvSpPr>
-          <p:cNvPr id="47" name="Rechteck 46">
-            <a:extLst>
-              <a:ext uri="{FF2B5EF4-FFF2-40B4-BE49-F238E27FC236}">
-                <a16:creationId xmlns:a16="http://schemas.microsoft.com/office/drawing/2014/main" id="{99F0F0FE-59A1-2FB0-5C69-A2C7DB44C1CD}"/>
+          <p:cNvPr id="50" name="Rechteck 49">
+            <a:extLst>
+              <a:ext uri="{FF2B5EF4-FFF2-40B4-BE49-F238E27FC236}">
+                <a16:creationId xmlns:a16="http://schemas.microsoft.com/office/drawing/2014/main" id="{B6FE92C4-084D-40B7-40B1-0BDDB5C6B66F}"/>
               </a:ext>
             </a:extLst>
           </p:cNvPr>
@@ -17572,8 +17569,116 @@
         </p:nvSpPr>
         <p:spPr>
           <a:xfrm>
-            <a:off x="4124543" y="3820112"/>
-            <a:ext cx="671086" cy="198212"/>
+            <a:off x="7655118" y="2104449"/>
+            <a:ext cx="483038" cy="329976"/>
+          </a:xfrm>
+          <a:prstGeom prst="rect">
+            <a:avLst/>
+          </a:prstGeom>
+          <a:solidFill>
+            <a:srgbClr val="DEDFE1">
+              <a:alpha val="80000"/>
+            </a:srgbClr>
+          </a:solidFill>
+          <a:ln>
+            <a:noFill/>
+          </a:ln>
+        </p:spPr>
+        <p:style>
+          <a:lnRef idx="2">
+            <a:schemeClr val="accent1">
+              <a:shade val="15000"/>
+            </a:schemeClr>
+          </a:lnRef>
+          <a:fillRef idx="1">
+            <a:schemeClr val="accent1"/>
+          </a:fillRef>
+          <a:effectRef idx="0">
+            <a:schemeClr val="accent1"/>
+          </a:effectRef>
+          <a:fontRef idx="minor">
+            <a:schemeClr val="lt1"/>
+          </a:fontRef>
+        </p:style>
+        <p:txBody>
+          <a:bodyPr rtlCol="0" anchor="ctr"/>
+          <a:lstStyle/>
+          <a:p>
+            <a:pPr algn="ctr"/>
+            <a:endParaRPr lang="de-DE"/>
+          </a:p>
+        </p:txBody>
+      </p:sp>
+      <p:sp>
+        <p:nvSpPr>
+          <p:cNvPr id="52" name="Rechteck 51">
+            <a:extLst>
+              <a:ext uri="{FF2B5EF4-FFF2-40B4-BE49-F238E27FC236}">
+                <a16:creationId xmlns:a16="http://schemas.microsoft.com/office/drawing/2014/main" id="{3D018EC0-D3C8-50A3-2C7B-A0361C6C3684}"/>
+              </a:ext>
+            </a:extLst>
+          </p:cNvPr>
+          <p:cNvSpPr/>
+          <p:nvPr/>
+        </p:nvSpPr>
+        <p:spPr>
+          <a:xfrm>
+            <a:off x="7655118" y="2461237"/>
+            <a:ext cx="483036" cy="298859"/>
+          </a:xfrm>
+          <a:prstGeom prst="rect">
+            <a:avLst/>
+          </a:prstGeom>
+          <a:solidFill>
+            <a:srgbClr val="DEDFE1">
+              <a:alpha val="80000"/>
+            </a:srgbClr>
+          </a:solidFill>
+          <a:ln>
+            <a:noFill/>
+          </a:ln>
+        </p:spPr>
+        <p:style>
+          <a:lnRef idx="2">
+            <a:schemeClr val="accent1">
+              <a:shade val="15000"/>
+            </a:schemeClr>
+          </a:lnRef>
+          <a:fillRef idx="1">
+            <a:schemeClr val="accent1"/>
+          </a:fillRef>
+          <a:effectRef idx="0">
+            <a:schemeClr val="accent1"/>
+          </a:effectRef>
+          <a:fontRef idx="minor">
+            <a:schemeClr val="lt1"/>
+          </a:fontRef>
+        </p:style>
+        <p:txBody>
+          <a:bodyPr rtlCol="0" anchor="ctr"/>
+          <a:lstStyle/>
+          <a:p>
+            <a:pPr algn="ctr"/>
+            <a:endParaRPr lang="de-DE"/>
+          </a:p>
+        </p:txBody>
+      </p:sp>
+      <p:sp>
+        <p:nvSpPr>
+          <p:cNvPr id="53" name="Rechteck 52">
+            <a:extLst>
+              <a:ext uri="{FF2B5EF4-FFF2-40B4-BE49-F238E27FC236}">
+                <a16:creationId xmlns:a16="http://schemas.microsoft.com/office/drawing/2014/main" id="{49BEE2ED-7679-93D1-6926-FEDD1DD9E602}"/>
+              </a:ext>
+            </a:extLst>
+          </p:cNvPr>
+          <p:cNvSpPr/>
+          <p:nvPr/>
+        </p:nvSpPr>
+        <p:spPr>
+          <a:xfrm>
+            <a:off x="7650640" y="2779413"/>
+            <a:ext cx="487514" cy="700189"/>
           </a:xfrm>
           <a:prstGeom prst="rect">
             <a:avLst/>
@@ -17614,10 +17719,10 @@
       </p:sp>
       <p:sp>
         <p:nvSpPr>
-          <p:cNvPr id="49" name="Rechteck 48">
-            <a:extLst>
-              <a:ext uri="{FF2B5EF4-FFF2-40B4-BE49-F238E27FC236}">
-                <a16:creationId xmlns:a16="http://schemas.microsoft.com/office/drawing/2014/main" id="{B4D17CA4-AF39-C0AA-725D-B74322FC9648}"/>
+          <p:cNvPr id="54" name="Rechteck 53">
+            <a:extLst>
+              <a:ext uri="{FF2B5EF4-FFF2-40B4-BE49-F238E27FC236}">
+                <a16:creationId xmlns:a16="http://schemas.microsoft.com/office/drawing/2014/main" id="{522CDFBD-5100-FC5F-27E4-FEE918000471}"/>
               </a:ext>
             </a:extLst>
           </p:cNvPr>
@@ -17626,62 +17731,8 @@
         </p:nvSpPr>
         <p:spPr>
           <a:xfrm>
-            <a:off x="4125340" y="2771981"/>
-            <a:ext cx="676413" cy="349234"/>
-          </a:xfrm>
-          <a:prstGeom prst="rect">
-            <a:avLst/>
-          </a:prstGeom>
-          <a:solidFill>
-            <a:srgbClr val="85C695">
-              <a:alpha val="80000"/>
-            </a:srgbClr>
-          </a:solidFill>
-          <a:ln>
-            <a:noFill/>
-          </a:ln>
-        </p:spPr>
-        <p:style>
-          <a:lnRef idx="2">
-            <a:schemeClr val="accent1">
-              <a:shade val="15000"/>
-            </a:schemeClr>
-          </a:lnRef>
-          <a:fillRef idx="1">
-            <a:schemeClr val="accent1"/>
-          </a:fillRef>
-          <a:effectRef idx="0">
-            <a:schemeClr val="accent1"/>
-          </a:effectRef>
-          <a:fontRef idx="minor">
-            <a:schemeClr val="lt1"/>
-          </a:fontRef>
-        </p:style>
-        <p:txBody>
-          <a:bodyPr rtlCol="0" anchor="ctr"/>
-          <a:lstStyle/>
-          <a:p>
-            <a:pPr algn="ctr"/>
-            <a:endParaRPr lang="de-DE"/>
-          </a:p>
-        </p:txBody>
-      </p:sp>
-      <p:sp>
-        <p:nvSpPr>
-          <p:cNvPr id="50" name="Rechteck 49">
-            <a:extLst>
-              <a:ext uri="{FF2B5EF4-FFF2-40B4-BE49-F238E27FC236}">
-                <a16:creationId xmlns:a16="http://schemas.microsoft.com/office/drawing/2014/main" id="{B6FE92C4-084D-40B7-40B1-0BDDB5C6B66F}"/>
-              </a:ext>
-            </a:extLst>
-          </p:cNvPr>
-          <p:cNvSpPr/>
-          <p:nvPr/>
-        </p:nvSpPr>
-        <p:spPr>
-          <a:xfrm>
-            <a:off x="7655118" y="2104449"/>
-            <a:ext cx="483038" cy="329976"/>
+            <a:off x="7655118" y="3509817"/>
+            <a:ext cx="483036" cy="282204"/>
           </a:xfrm>
           <a:prstGeom prst="rect">
             <a:avLst/>
@@ -17722,10 +17773,10 @@
       </p:sp>
       <p:sp>
         <p:nvSpPr>
-          <p:cNvPr id="52" name="Rechteck 51">
-            <a:extLst>
-              <a:ext uri="{FF2B5EF4-FFF2-40B4-BE49-F238E27FC236}">
-                <a16:creationId xmlns:a16="http://schemas.microsoft.com/office/drawing/2014/main" id="{3D018EC0-D3C8-50A3-2C7B-A0361C6C3684}"/>
+          <p:cNvPr id="56" name="Rechteck 55">
+            <a:extLst>
+              <a:ext uri="{FF2B5EF4-FFF2-40B4-BE49-F238E27FC236}">
+                <a16:creationId xmlns:a16="http://schemas.microsoft.com/office/drawing/2014/main" id="{A88DC59B-0D25-157B-FB50-D6815E3B122C}"/>
               </a:ext>
             </a:extLst>
           </p:cNvPr>
@@ -17734,8 +17785,8 @@
         </p:nvSpPr>
         <p:spPr>
           <a:xfrm>
-            <a:off x="7655118" y="2461237"/>
-            <a:ext cx="483036" cy="298859"/>
+            <a:off x="7655118" y="3820111"/>
+            <a:ext cx="483036" cy="623913"/>
           </a:xfrm>
           <a:prstGeom prst="rect">
             <a:avLst/>
@@ -17776,10 +17827,10 @@
       </p:sp>
       <p:sp>
         <p:nvSpPr>
-          <p:cNvPr id="53" name="Rechteck 52">
-            <a:extLst>
-              <a:ext uri="{FF2B5EF4-FFF2-40B4-BE49-F238E27FC236}">
-                <a16:creationId xmlns:a16="http://schemas.microsoft.com/office/drawing/2014/main" id="{49BEE2ED-7679-93D1-6926-FEDD1DD9E602}"/>
+          <p:cNvPr id="58" name="Rechteck 57">
+            <a:extLst>
+              <a:ext uri="{FF2B5EF4-FFF2-40B4-BE49-F238E27FC236}">
+                <a16:creationId xmlns:a16="http://schemas.microsoft.com/office/drawing/2014/main" id="{FA182DDA-6C39-6FF2-5BFF-1FFA3B1C7280}"/>
               </a:ext>
             </a:extLst>
           </p:cNvPr>
@@ -17788,8 +17839,8 @@
         </p:nvSpPr>
         <p:spPr>
           <a:xfrm>
-            <a:off x="7650640" y="2779413"/>
-            <a:ext cx="487514" cy="700189"/>
+            <a:off x="7641202" y="1087756"/>
+            <a:ext cx="153059" cy="381147"/>
           </a:xfrm>
           <a:prstGeom prst="rect">
             <a:avLst/>
@@ -17830,182 +17881,20 @@
       </p:sp>
       <p:sp>
         <p:nvSpPr>
-          <p:cNvPr id="54" name="Rechteck 53">
-            <a:extLst>
-              <a:ext uri="{FF2B5EF4-FFF2-40B4-BE49-F238E27FC236}">
-                <a16:creationId xmlns:a16="http://schemas.microsoft.com/office/drawing/2014/main" id="{522CDFBD-5100-FC5F-27E4-FEE918000471}"/>
-              </a:ext>
-            </a:extLst>
-          </p:cNvPr>
-          <p:cNvSpPr/>
+          <p:cNvPr id="62" name="Textfeld 61">
+            <a:extLst>
+              <a:ext uri="{FF2B5EF4-FFF2-40B4-BE49-F238E27FC236}">
+                <a16:creationId xmlns:a16="http://schemas.microsoft.com/office/drawing/2014/main" id="{C5E65DAC-E2C1-D062-D371-7765BC5E1116}"/>
+              </a:ext>
+            </a:extLst>
+          </p:cNvPr>
+          <p:cNvSpPr txBox="1"/>
           <p:nvPr/>
         </p:nvSpPr>
         <p:spPr>
           <a:xfrm>
-            <a:off x="7655118" y="3509817"/>
-            <a:ext cx="483036" cy="282204"/>
-          </a:xfrm>
-          <a:prstGeom prst="rect">
-            <a:avLst/>
-          </a:prstGeom>
-          <a:solidFill>
-            <a:srgbClr val="DEDFE1">
-              <a:alpha val="80000"/>
-            </a:srgbClr>
-          </a:solidFill>
-          <a:ln>
-            <a:noFill/>
-          </a:ln>
-        </p:spPr>
-        <p:style>
-          <a:lnRef idx="2">
-            <a:schemeClr val="accent1">
-              <a:shade val="15000"/>
-            </a:schemeClr>
-          </a:lnRef>
-          <a:fillRef idx="1">
-            <a:schemeClr val="accent1"/>
-          </a:fillRef>
-          <a:effectRef idx="0">
-            <a:schemeClr val="accent1"/>
-          </a:effectRef>
-          <a:fontRef idx="minor">
-            <a:schemeClr val="lt1"/>
-          </a:fontRef>
-        </p:style>
-        <p:txBody>
-          <a:bodyPr rtlCol="0" anchor="ctr"/>
-          <a:lstStyle/>
-          <a:p>
-            <a:pPr algn="ctr"/>
-            <a:endParaRPr lang="de-DE"/>
-          </a:p>
-        </p:txBody>
-      </p:sp>
-      <p:sp>
-        <p:nvSpPr>
-          <p:cNvPr id="56" name="Rechteck 55">
-            <a:extLst>
-              <a:ext uri="{FF2B5EF4-FFF2-40B4-BE49-F238E27FC236}">
-                <a16:creationId xmlns:a16="http://schemas.microsoft.com/office/drawing/2014/main" id="{A88DC59B-0D25-157B-FB50-D6815E3B122C}"/>
-              </a:ext>
-            </a:extLst>
-          </p:cNvPr>
-          <p:cNvSpPr/>
-          <p:nvPr/>
-        </p:nvSpPr>
-        <p:spPr>
-          <a:xfrm>
-            <a:off x="7655118" y="3820111"/>
-            <a:ext cx="483036" cy="623913"/>
-          </a:xfrm>
-          <a:prstGeom prst="rect">
-            <a:avLst/>
-          </a:prstGeom>
-          <a:solidFill>
-            <a:srgbClr val="DEDFE1">
-              <a:alpha val="80000"/>
-            </a:srgbClr>
-          </a:solidFill>
-          <a:ln>
-            <a:noFill/>
-          </a:ln>
-        </p:spPr>
-        <p:style>
-          <a:lnRef idx="2">
-            <a:schemeClr val="accent1">
-              <a:shade val="15000"/>
-            </a:schemeClr>
-          </a:lnRef>
-          <a:fillRef idx="1">
-            <a:schemeClr val="accent1"/>
-          </a:fillRef>
-          <a:effectRef idx="0">
-            <a:schemeClr val="accent1"/>
-          </a:effectRef>
-          <a:fontRef idx="minor">
-            <a:schemeClr val="lt1"/>
-          </a:fontRef>
-        </p:style>
-        <p:txBody>
-          <a:bodyPr rtlCol="0" anchor="ctr"/>
-          <a:lstStyle/>
-          <a:p>
-            <a:pPr algn="ctr"/>
-            <a:endParaRPr lang="de-DE"/>
-          </a:p>
-        </p:txBody>
-      </p:sp>
-      <p:sp>
-        <p:nvSpPr>
-          <p:cNvPr id="58" name="Rechteck 57">
-            <a:extLst>
-              <a:ext uri="{FF2B5EF4-FFF2-40B4-BE49-F238E27FC236}">
-                <a16:creationId xmlns:a16="http://schemas.microsoft.com/office/drawing/2014/main" id="{FA182DDA-6C39-6FF2-5BFF-1FFA3B1C7280}"/>
-              </a:ext>
-            </a:extLst>
-          </p:cNvPr>
-          <p:cNvSpPr/>
-          <p:nvPr/>
-        </p:nvSpPr>
-        <p:spPr>
-          <a:xfrm>
-            <a:off x="7641202" y="1087756"/>
-            <a:ext cx="153059" cy="381147"/>
-          </a:xfrm>
-          <a:prstGeom prst="rect">
-            <a:avLst/>
-          </a:prstGeom>
-          <a:solidFill>
-            <a:srgbClr val="DEDFE1">
-              <a:alpha val="80000"/>
-            </a:srgbClr>
-          </a:solidFill>
-          <a:ln>
-            <a:noFill/>
-          </a:ln>
-        </p:spPr>
-        <p:style>
-          <a:lnRef idx="2">
-            <a:schemeClr val="accent1">
-              <a:shade val="15000"/>
-            </a:schemeClr>
-          </a:lnRef>
-          <a:fillRef idx="1">
-            <a:schemeClr val="accent1"/>
-          </a:fillRef>
-          <a:effectRef idx="0">
-            <a:schemeClr val="accent1"/>
-          </a:effectRef>
-          <a:fontRef idx="minor">
-            <a:schemeClr val="lt1"/>
-          </a:fontRef>
-        </p:style>
-        <p:txBody>
-          <a:bodyPr rtlCol="0" anchor="ctr"/>
-          <a:lstStyle/>
-          <a:p>
-            <a:pPr algn="ctr"/>
-            <a:endParaRPr lang="de-DE"/>
-          </a:p>
-        </p:txBody>
-      </p:sp>
-      <p:sp>
-        <p:nvSpPr>
-          <p:cNvPr id="61" name="Textfeld 60">
-            <a:extLst>
-              <a:ext uri="{FF2B5EF4-FFF2-40B4-BE49-F238E27FC236}">
-                <a16:creationId xmlns:a16="http://schemas.microsoft.com/office/drawing/2014/main" id="{309C088E-C785-C4FA-3BF4-1434C9552439}"/>
-              </a:ext>
-            </a:extLst>
-          </p:cNvPr>
-          <p:cNvSpPr txBox="1"/>
-          <p:nvPr/>
-        </p:nvSpPr>
-        <p:spPr>
-          <a:xfrm>
-            <a:off x="6181321" y="1663341"/>
-            <a:ext cx="714356" cy="200055"/>
+            <a:off x="6813635" y="1622152"/>
+            <a:ext cx="901611" cy="307777"/>
           </a:xfrm>
           <a:prstGeom prst="rect">
             <a:avLst/>
@@ -18023,17 +17912,17 @@
                 <a:latin typeface="Arial" panose="020B0604020202020204" pitchFamily="34" charset="0"/>
                 <a:cs typeface="Arial" panose="020B0604020202020204" pitchFamily="34" charset="0"/>
               </a:rPr>
-              <a:t>Informatik</a:t>
+              <a:t>Angebot für Kinder</a:t>
             </a:r>
           </a:p>
         </p:txBody>
       </p:sp>
       <p:sp>
         <p:nvSpPr>
-          <p:cNvPr id="62" name="Textfeld 61">
-            <a:extLst>
-              <a:ext uri="{FF2B5EF4-FFF2-40B4-BE49-F238E27FC236}">
-                <a16:creationId xmlns:a16="http://schemas.microsoft.com/office/drawing/2014/main" id="{C5E65DAC-E2C1-D062-D371-7765BC5E1116}"/>
+          <p:cNvPr id="64" name="Textfeld 63">
+            <a:extLst>
+              <a:ext uri="{FF2B5EF4-FFF2-40B4-BE49-F238E27FC236}">
+                <a16:creationId xmlns:a16="http://schemas.microsoft.com/office/drawing/2014/main" id="{796F748F-5F07-7497-08C0-6BADB8CDCB0C}"/>
               </a:ext>
             </a:extLst>
           </p:cNvPr>
@@ -18042,8 +17931,8 @@
         </p:nvSpPr>
         <p:spPr>
           <a:xfrm>
-            <a:off x="6768085" y="1663759"/>
-            <a:ext cx="901611" cy="200055"/>
+            <a:off x="4055416" y="2733986"/>
+            <a:ext cx="842837" cy="307777"/>
           </a:xfrm>
           <a:prstGeom prst="rect">
             <a:avLst/>
@@ -18061,17 +17950,17 @@
                 <a:latin typeface="Arial" panose="020B0604020202020204" pitchFamily="34" charset="0"/>
                 <a:cs typeface="Arial" panose="020B0604020202020204" pitchFamily="34" charset="0"/>
               </a:rPr>
-              <a:t>Elektrotechnik</a:t>
+              <a:t>Industrie-kaufleute</a:t>
             </a:r>
           </a:p>
         </p:txBody>
       </p:sp>
       <p:sp>
         <p:nvSpPr>
-          <p:cNvPr id="64" name="Textfeld 63">
-            <a:extLst>
-              <a:ext uri="{FF2B5EF4-FFF2-40B4-BE49-F238E27FC236}">
-                <a16:creationId xmlns:a16="http://schemas.microsoft.com/office/drawing/2014/main" id="{796F748F-5F07-7497-08C0-6BADB8CDCB0C}"/>
+          <p:cNvPr id="67" name="Textfeld 66">
+            <a:extLst>
+              <a:ext uri="{FF2B5EF4-FFF2-40B4-BE49-F238E27FC236}">
+                <a16:creationId xmlns:a16="http://schemas.microsoft.com/office/drawing/2014/main" id="{F54D3290-0038-156A-BB00-68D6C4C35774}"/>
               </a:ext>
             </a:extLst>
           </p:cNvPr>
@@ -18080,8 +17969,8 @@
         </p:nvSpPr>
         <p:spPr>
           <a:xfrm>
-            <a:off x="4055416" y="2733986"/>
-            <a:ext cx="842837" cy="415498"/>
+            <a:off x="4096248" y="3274799"/>
+            <a:ext cx="842837" cy="307777"/>
           </a:xfrm>
           <a:prstGeom prst="rect">
             <a:avLst/>
@@ -18099,130 +17988,45 @@
                 <a:latin typeface="Arial" panose="020B0604020202020204" pitchFamily="34" charset="0"/>
                 <a:cs typeface="Arial" panose="020B0604020202020204" pitchFamily="34" charset="0"/>
               </a:rPr>
-              <a:t>Wirtschafts-ingenieure/</a:t>
+              <a:t>Studiengänge bei WAGO</a:t>
             </a:r>
           </a:p>
+        </p:txBody>
+      </p:sp>
+      <p:sp>
+        <p:nvSpPr>
+          <p:cNvPr id="68" name="Textfeld 67">
+            <a:extLst>
+              <a:ext uri="{FF2B5EF4-FFF2-40B4-BE49-F238E27FC236}">
+                <a16:creationId xmlns:a16="http://schemas.microsoft.com/office/drawing/2014/main" id="{F14EB7DC-1E87-A70C-20D1-D3FA99F2A368}"/>
+              </a:ext>
+            </a:extLst>
+          </p:cNvPr>
+          <p:cNvSpPr txBox="1"/>
+          <p:nvPr/>
+        </p:nvSpPr>
+        <p:spPr>
+          <a:xfrm>
+            <a:off x="5159210" y="3526333"/>
+            <a:ext cx="1254424" cy="954107"/>
+          </a:xfrm>
+          <a:prstGeom prst="rect">
+            <a:avLst/>
+          </a:prstGeom>
+          <a:noFill/>
+        </p:spPr>
+        <p:txBody>
+          <a:bodyPr wrap="square" rtlCol="0">
+            <a:spAutoFit/>
+          </a:bodyPr>
+          <a:lstStyle/>
           <a:p>
             <a:r>
               <a:rPr lang="de-DE" sz="700" dirty="0">
                 <a:latin typeface="Arial" panose="020B0604020202020204" pitchFamily="34" charset="0"/>
                 <a:cs typeface="Arial" panose="020B0604020202020204" pitchFamily="34" charset="0"/>
               </a:rPr>
-              <a:t>Maschinenbau</a:t>
-            </a:r>
-          </a:p>
-        </p:txBody>
-      </p:sp>
-      <p:sp>
-        <p:nvSpPr>
-          <p:cNvPr id="65" name="Textfeld 64">
-            <a:extLst>
-              <a:ext uri="{FF2B5EF4-FFF2-40B4-BE49-F238E27FC236}">
-                <a16:creationId xmlns:a16="http://schemas.microsoft.com/office/drawing/2014/main" id="{C30C816E-60D1-6745-F1D7-4C62C6620095}"/>
-              </a:ext>
-            </a:extLst>
-          </p:cNvPr>
-          <p:cNvSpPr txBox="1"/>
-          <p:nvPr/>
-        </p:nvSpPr>
-        <p:spPr>
-          <a:xfrm>
-            <a:off x="4086641" y="3163846"/>
-            <a:ext cx="842837" cy="307777"/>
-          </a:xfrm>
-          <a:prstGeom prst="rect">
-            <a:avLst/>
-          </a:prstGeom>
-          <a:noFill/>
-        </p:spPr>
-        <p:txBody>
-          <a:bodyPr wrap="square" rtlCol="0">
-            <a:spAutoFit/>
-          </a:bodyPr>
-          <a:lstStyle/>
-          <a:p>
-            <a:r>
-              <a:rPr lang="de-DE" sz="700" dirty="0">
-                <a:latin typeface="Arial" panose="020B0604020202020204" pitchFamily="34" charset="0"/>
-                <a:cs typeface="Arial" panose="020B0604020202020204" pitchFamily="34" charset="0"/>
-              </a:rPr>
-              <a:t>Technisches Produktdesign</a:t>
-            </a:r>
-          </a:p>
-        </p:txBody>
-      </p:sp>
-      <p:sp>
-        <p:nvSpPr>
-          <p:cNvPr id="67" name="Textfeld 66">
-            <a:extLst>
-              <a:ext uri="{FF2B5EF4-FFF2-40B4-BE49-F238E27FC236}">
-                <a16:creationId xmlns:a16="http://schemas.microsoft.com/office/drawing/2014/main" id="{F54D3290-0038-156A-BB00-68D6C4C35774}"/>
-              </a:ext>
-            </a:extLst>
-          </p:cNvPr>
-          <p:cNvSpPr txBox="1"/>
-          <p:nvPr/>
-        </p:nvSpPr>
-        <p:spPr>
-          <a:xfrm>
-            <a:off x="4096248" y="3505860"/>
-            <a:ext cx="842837" cy="307777"/>
-          </a:xfrm>
-          <a:prstGeom prst="rect">
-            <a:avLst/>
-          </a:prstGeom>
-          <a:noFill/>
-        </p:spPr>
-        <p:txBody>
-          <a:bodyPr wrap="square" rtlCol="0">
-            <a:spAutoFit/>
-          </a:bodyPr>
-          <a:lstStyle/>
-          <a:p>
-            <a:r>
-              <a:rPr lang="de-DE" sz="700" dirty="0">
-                <a:latin typeface="Arial" panose="020B0604020202020204" pitchFamily="34" charset="0"/>
-                <a:cs typeface="Arial" panose="020B0604020202020204" pitchFamily="34" charset="0"/>
-              </a:rPr>
-              <a:t>Industriekauf-leute</a:t>
-            </a:r>
-          </a:p>
-        </p:txBody>
-      </p:sp>
-      <p:sp>
-        <p:nvSpPr>
-          <p:cNvPr id="68" name="Textfeld 67">
-            <a:extLst>
-              <a:ext uri="{FF2B5EF4-FFF2-40B4-BE49-F238E27FC236}">
-                <a16:creationId xmlns:a16="http://schemas.microsoft.com/office/drawing/2014/main" id="{F14EB7DC-1E87-A70C-20D1-D3FA99F2A368}"/>
-              </a:ext>
-            </a:extLst>
-          </p:cNvPr>
-          <p:cNvSpPr txBox="1"/>
-          <p:nvPr/>
-        </p:nvSpPr>
-        <p:spPr>
-          <a:xfrm>
-            <a:off x="5159210" y="3526333"/>
-            <a:ext cx="1254424" cy="846386"/>
-          </a:xfrm>
-          <a:prstGeom prst="rect">
-            <a:avLst/>
-          </a:prstGeom>
-          <a:noFill/>
-        </p:spPr>
-        <p:txBody>
-          <a:bodyPr wrap="square" rtlCol="0">
-            <a:spAutoFit/>
-          </a:bodyPr>
-          <a:lstStyle/>
-          <a:p>
-            <a:r>
-              <a:rPr lang="de-DE" sz="700" dirty="0">
-                <a:latin typeface="Arial" panose="020B0604020202020204" pitchFamily="34" charset="0"/>
-                <a:cs typeface="Arial" panose="020B0604020202020204" pitchFamily="34" charset="0"/>
-              </a:rPr>
-              <a:t>Elektroniker für</a:t>
+              <a:t>Elektroniker* für</a:t>
             </a:r>
           </a:p>
           <a:p>
@@ -18280,6 +18084,15 @@
                 <a:latin typeface="Arial" panose="020B0604020202020204" pitchFamily="34" charset="0"/>
                 <a:cs typeface="Arial" panose="020B0604020202020204" pitchFamily="34" charset="0"/>
               </a:rPr>
+              <a:t>Industrieelektriker*</a:t>
+            </a:r>
+          </a:p>
+          <a:p>
+            <a:r>
+              <a:rPr lang="de-DE" sz="700" dirty="0">
+                <a:latin typeface="Arial" panose="020B0604020202020204" pitchFamily="34" charset="0"/>
+                <a:cs typeface="Arial" panose="020B0604020202020204" pitchFamily="34" charset="0"/>
+              </a:rPr>
               <a:t>Mechatronik</a:t>
             </a:r>
           </a:p>
@@ -18322,7 +18135,7 @@
                 <a:latin typeface="Arial" panose="020B0604020202020204" pitchFamily="34" charset="0"/>
                 <a:cs typeface="Arial" panose="020B0604020202020204" pitchFamily="34" charset="0"/>
               </a:rPr>
-              <a:t>Werkzeugmechaniker</a:t>
+              <a:t>Werkzeugmechaniker*</a:t>
             </a:r>
           </a:p>
           <a:p>
@@ -18335,7 +18148,7 @@
                 <a:latin typeface="Arial" panose="020B0604020202020204" pitchFamily="34" charset="0"/>
                 <a:cs typeface="Arial" panose="020B0604020202020204" pitchFamily="34" charset="0"/>
               </a:rPr>
-              <a:t>Industriemechaniker</a:t>
+              <a:t>Industriemechaniker*</a:t>
             </a:r>
           </a:p>
           <a:p>
@@ -18348,7 +18161,7 @@
                 <a:latin typeface="Arial" panose="020B0604020202020204" pitchFamily="34" charset="0"/>
                 <a:cs typeface="Arial" panose="020B0604020202020204" pitchFamily="34" charset="0"/>
               </a:rPr>
-              <a:t>Maschinen- und Anlagenführer</a:t>
+              <a:t>Maschinen- und Anlagenführer*</a:t>
             </a:r>
           </a:p>
           <a:p>
@@ -18361,7 +18174,7 @@
                 <a:latin typeface="Arial" panose="020B0604020202020204" pitchFamily="34" charset="0"/>
                 <a:cs typeface="Arial" panose="020B0604020202020204" pitchFamily="34" charset="0"/>
               </a:rPr>
-              <a:t>Fachlagerist</a:t>
+              <a:t>Fachlagerist*</a:t>
             </a:r>
           </a:p>
           <a:p>
@@ -18543,8 +18356,8 @@
         </p:blipFill>
         <p:spPr>
           <a:xfrm>
-            <a:off x="1892106" y="2777156"/>
-            <a:ext cx="307777" cy="307777"/>
+            <a:off x="5320148" y="2186130"/>
+            <a:ext cx="279824" cy="279824"/>
           </a:xfrm>
           <a:prstGeom prst="rect">
             <a:avLst/>
@@ -18660,14 +18473,95 @@
         </p:blipFill>
         <p:spPr>
           <a:xfrm>
-            <a:off x="1364639" y="2745625"/>
-            <a:ext cx="358005" cy="358005"/>
+            <a:off x="5998074" y="2125458"/>
+            <a:ext cx="324069" cy="324069"/>
           </a:xfrm>
           <a:prstGeom prst="rect">
             <a:avLst/>
           </a:prstGeom>
         </p:spPr>
       </p:pic>
+      <p:sp>
+        <p:nvSpPr>
+          <p:cNvPr id="2" name="Textfeld 1">
+            <a:extLst>
+              <a:ext uri="{FF2B5EF4-FFF2-40B4-BE49-F238E27FC236}">
+                <a16:creationId xmlns:a16="http://schemas.microsoft.com/office/drawing/2014/main" id="{1DAC0F08-B900-7188-34CC-B2718E8582A5}"/>
+              </a:ext>
+            </a:extLst>
+          </p:cNvPr>
+          <p:cNvSpPr txBox="1"/>
+          <p:nvPr/>
+        </p:nvSpPr>
+        <p:spPr>
+          <a:xfrm>
+            <a:off x="7600487" y="2887096"/>
+            <a:ext cx="612885" cy="523220"/>
+          </a:xfrm>
+          <a:prstGeom prst="rect">
+            <a:avLst/>
+          </a:prstGeom>
+          <a:noFill/>
+        </p:spPr>
+        <p:txBody>
+          <a:bodyPr wrap="square" rtlCol="0">
+            <a:spAutoFit/>
+          </a:bodyPr>
+          <a:lstStyle/>
+          <a:p>
+            <a:r>
+              <a:rPr lang="de-DE" sz="700" dirty="0">
+                <a:latin typeface="Arial" panose="020B0604020202020204" pitchFamily="34" charset="0"/>
+                <a:cs typeface="Arial" panose="020B0604020202020204" pitchFamily="34" charset="0"/>
+              </a:rPr>
+              <a:t>techni-sche Produkt-designer*</a:t>
+            </a:r>
+          </a:p>
+        </p:txBody>
+      </p:sp>
+      <p:cxnSp>
+        <p:nvCxnSpPr>
+          <p:cNvPr id="20" name="Gerader Verbinder 19">
+            <a:extLst>
+              <a:ext uri="{FF2B5EF4-FFF2-40B4-BE49-F238E27FC236}">
+                <a16:creationId xmlns:a16="http://schemas.microsoft.com/office/drawing/2014/main" id="{82E1057E-61EA-591F-E268-17D10D0ED1BB}"/>
+              </a:ext>
+            </a:extLst>
+          </p:cNvPr>
+          <p:cNvCxnSpPr>
+            <a:cxnSpLocks/>
+          </p:cNvCxnSpPr>
+          <p:nvPr/>
+        </p:nvCxnSpPr>
+        <p:spPr>
+          <a:xfrm flipV="1">
+            <a:off x="5110036" y="2326042"/>
+            <a:ext cx="0" cy="135195"/>
+          </a:xfrm>
+          <a:prstGeom prst="line">
+            <a:avLst/>
+          </a:prstGeom>
+          <a:ln w="28575">
+            <a:solidFill>
+              <a:srgbClr val="7EC635"/>
+            </a:solidFill>
+          </a:ln>
+        </p:spPr>
+        <p:style>
+          <a:lnRef idx="1">
+            <a:schemeClr val="accent1"/>
+          </a:lnRef>
+          <a:fillRef idx="0">
+            <a:schemeClr val="accent1"/>
+          </a:fillRef>
+          <a:effectRef idx="0">
+            <a:schemeClr val="accent1"/>
+          </a:effectRef>
+          <a:fontRef idx="minor">
+            <a:schemeClr val="tx1"/>
+          </a:fontRef>
+        </p:style>
+      </p:cxnSp>
     </p:spTree>
     <p:extLst>
       <p:ext uri="{BB962C8B-B14F-4D97-AF65-F5344CB8AC3E}">

</xml_diff>

<commit_message>
Add "Eingang" to map + update todos
</commit_message>
<xml_diff>
--- a/Website_TdA_2024.pptx
+++ b/Website_TdA_2024.pptx
@@ -133,7 +133,7 @@
 <file path=ppt/revisionInfo.xml><?xml version="1.0" encoding="utf-8"?>
 <p1510:revInfo xmlns:a="http://schemas.openxmlformats.org/drawingml/2006/main" xmlns:r="http://schemas.openxmlformats.org/officeDocument/2006/relationships" xmlns:p1510="http://schemas.microsoft.com/office/powerpoint/2015/10/main">
   <p1510:revLst>
-    <p1510:client id="{96D7FF0F-B081-4A9D-BD68-D3EBAC727EF5}" v="215" dt="2024-02-13T10:04:16.026"/>
+    <p1510:client id="{96D7FF0F-B081-4A9D-BD68-D3EBAC727EF5}" v="216" dt="2024-02-16T07:30:18.316"/>
   </p1510:revLst>
 </p1510:revInfo>
 </file>
@@ -143,7 +143,7 @@
   <pc:docChgLst>
     <pc:chgData name="Stapel, Frederic" userId="1abc07cd-784c-4ede-87bc-7246762e1d08" providerId="ADAL" clId="{96D7FF0F-B081-4A9D-BD68-D3EBAC727EF5}"/>
     <pc:docChg chg="undo redo custSel addSld delSld modSld sldOrd">
-      <pc:chgData name="Stapel, Frederic" userId="1abc07cd-784c-4ede-87bc-7246762e1d08" providerId="ADAL" clId="{96D7FF0F-B081-4A9D-BD68-D3EBAC727EF5}" dt="2024-02-13T10:05:53.810" v="4180" actId="20577"/>
+      <pc:chgData name="Stapel, Frederic" userId="1abc07cd-784c-4ede-87bc-7246762e1d08" providerId="ADAL" clId="{96D7FF0F-B081-4A9D-BD68-D3EBAC727EF5}" dt="2024-02-16T07:30:30.575" v="4190" actId="1076"/>
       <pc:docMkLst>
         <pc:docMk/>
       </pc:docMkLst>
@@ -1704,7 +1704,7 @@
         </pc:picChg>
       </pc:sldChg>
       <pc:sldChg chg="addSp delSp modSp add mod modNotesTx">
-        <pc:chgData name="Stapel, Frederic" userId="1abc07cd-784c-4ede-87bc-7246762e1d08" providerId="ADAL" clId="{96D7FF0F-B081-4A9D-BD68-D3EBAC727EF5}" dt="2024-02-13T10:05:53.810" v="4180" actId="20577"/>
+        <pc:chgData name="Stapel, Frederic" userId="1abc07cd-784c-4ede-87bc-7246762e1d08" providerId="ADAL" clId="{96D7FF0F-B081-4A9D-BD68-D3EBAC727EF5}" dt="2024-02-16T07:30:30.575" v="4190" actId="1076"/>
         <pc:sldMkLst>
           <pc:docMk/>
           <pc:sldMk cId="459294818" sldId="274"/>
@@ -1723,6 +1723,14 @@
             <pc:docMk/>
             <pc:sldMk cId="459294818" sldId="274"/>
             <ac:spMk id="6" creationId="{18CF9B01-BEE6-68F4-E019-97EFB0BBC02C}"/>
+          </ac:spMkLst>
+        </pc:spChg>
+        <pc:spChg chg="add mod">
+          <ac:chgData name="Stapel, Frederic" userId="1abc07cd-784c-4ede-87bc-7246762e1d08" providerId="ADAL" clId="{96D7FF0F-B081-4A9D-BD68-D3EBAC727EF5}" dt="2024-02-16T07:30:30.575" v="4190" actId="1076"/>
+          <ac:spMkLst>
+            <pc:docMk/>
+            <pc:sldMk cId="459294818" sldId="274"/>
+            <ac:spMk id="6" creationId="{AE90D8D0-467D-5F3B-2565-D53FB5A4F58D}"/>
           </ac:spMkLst>
         </pc:spChg>
         <pc:spChg chg="add mod">
@@ -2412,7 +2420,7 @@
           <a:p>
             <a:fld id="{326D799F-86D4-4539-9CF8-30237CED92B1}" type="datetimeFigureOut">
               <a:rPr lang="de-DE" smtClean="0"/>
-              <a:t>13.02.2024</a:t>
+              <a:t>16.02.2024</a:t>
             </a:fld>
             <a:endParaRPr lang="de-DE"/>
           </a:p>
@@ -2910,7 +2918,7 @@
           <a:p>
             <a:fld id="{5F34389D-718A-4B70-99B4-5B2AAB6EE550}" type="datetimeFigureOut">
               <a:rPr lang="de-DE" smtClean="0"/>
-              <a:t>13.02.2024</a:t>
+              <a:t>16.02.2024</a:t>
             </a:fld>
             <a:endParaRPr lang="de-DE"/>
           </a:p>
@@ -3108,7 +3116,7 @@
           <a:p>
             <a:fld id="{5F34389D-718A-4B70-99B4-5B2AAB6EE550}" type="datetimeFigureOut">
               <a:rPr lang="de-DE" smtClean="0"/>
-              <a:t>13.02.2024</a:t>
+              <a:t>16.02.2024</a:t>
             </a:fld>
             <a:endParaRPr lang="de-DE"/>
           </a:p>
@@ -3316,7 +3324,7 @@
           <a:p>
             <a:fld id="{5F34389D-718A-4B70-99B4-5B2AAB6EE550}" type="datetimeFigureOut">
               <a:rPr lang="de-DE" smtClean="0"/>
-              <a:t>13.02.2024</a:t>
+              <a:t>16.02.2024</a:t>
             </a:fld>
             <a:endParaRPr lang="de-DE"/>
           </a:p>
@@ -3514,7 +3522,7 @@
           <a:p>
             <a:fld id="{5F34389D-718A-4B70-99B4-5B2AAB6EE550}" type="datetimeFigureOut">
               <a:rPr lang="de-DE" smtClean="0"/>
-              <a:t>13.02.2024</a:t>
+              <a:t>16.02.2024</a:t>
             </a:fld>
             <a:endParaRPr lang="de-DE"/>
           </a:p>
@@ -3789,7 +3797,7 @@
           <a:p>
             <a:fld id="{5F34389D-718A-4B70-99B4-5B2AAB6EE550}" type="datetimeFigureOut">
               <a:rPr lang="de-DE" smtClean="0"/>
-              <a:t>13.02.2024</a:t>
+              <a:t>16.02.2024</a:t>
             </a:fld>
             <a:endParaRPr lang="de-DE"/>
           </a:p>
@@ -4054,7 +4062,7 @@
           <a:p>
             <a:fld id="{5F34389D-718A-4B70-99B4-5B2AAB6EE550}" type="datetimeFigureOut">
               <a:rPr lang="de-DE" smtClean="0"/>
-              <a:t>13.02.2024</a:t>
+              <a:t>16.02.2024</a:t>
             </a:fld>
             <a:endParaRPr lang="de-DE"/>
           </a:p>
@@ -4466,7 +4474,7 @@
           <a:p>
             <a:fld id="{5F34389D-718A-4B70-99B4-5B2AAB6EE550}" type="datetimeFigureOut">
               <a:rPr lang="de-DE" smtClean="0"/>
-              <a:t>13.02.2024</a:t>
+              <a:t>16.02.2024</a:t>
             </a:fld>
             <a:endParaRPr lang="de-DE"/>
           </a:p>
@@ -4607,7 +4615,7 @@
           <a:p>
             <a:fld id="{5F34389D-718A-4B70-99B4-5B2AAB6EE550}" type="datetimeFigureOut">
               <a:rPr lang="de-DE" smtClean="0"/>
-              <a:t>13.02.2024</a:t>
+              <a:t>16.02.2024</a:t>
             </a:fld>
             <a:endParaRPr lang="de-DE"/>
           </a:p>
@@ -4720,7 +4728,7 @@
           <a:p>
             <a:fld id="{5F34389D-718A-4B70-99B4-5B2AAB6EE550}" type="datetimeFigureOut">
               <a:rPr lang="de-DE" smtClean="0"/>
-              <a:t>13.02.2024</a:t>
+              <a:t>16.02.2024</a:t>
             </a:fld>
             <a:endParaRPr lang="de-DE"/>
           </a:p>
@@ -5031,7 +5039,7 @@
           <a:p>
             <a:fld id="{5F34389D-718A-4B70-99B4-5B2AAB6EE550}" type="datetimeFigureOut">
               <a:rPr lang="de-DE" smtClean="0"/>
-              <a:t>13.02.2024</a:t>
+              <a:t>16.02.2024</a:t>
             </a:fld>
             <a:endParaRPr lang="de-DE"/>
           </a:p>
@@ -5319,7 +5327,7 @@
           <a:p>
             <a:fld id="{5F34389D-718A-4B70-99B4-5B2AAB6EE550}" type="datetimeFigureOut">
               <a:rPr lang="de-DE" smtClean="0"/>
-              <a:t>13.02.2024</a:t>
+              <a:t>16.02.2024</a:t>
             </a:fld>
             <a:endParaRPr lang="de-DE"/>
           </a:p>
@@ -5560,7 +5568,7 @@
           <a:p>
             <a:fld id="{5F34389D-718A-4B70-99B4-5B2AAB6EE550}" type="datetimeFigureOut">
               <a:rPr lang="de-DE" smtClean="0"/>
-              <a:t>13.02.2024</a:t>
+              <a:t>16.02.2024</a:t>
             </a:fld>
             <a:endParaRPr lang="de-DE"/>
           </a:p>
@@ -18562,6 +18570,44 @@
           </a:fontRef>
         </p:style>
       </p:cxnSp>
+      <p:sp>
+        <p:nvSpPr>
+          <p:cNvPr id="6" name="Textfeld 5">
+            <a:extLst>
+              <a:ext uri="{FF2B5EF4-FFF2-40B4-BE49-F238E27FC236}">
+                <a16:creationId xmlns:a16="http://schemas.microsoft.com/office/drawing/2014/main" id="{AE90D8D0-467D-5F3B-2565-D53FB5A4F58D}"/>
+              </a:ext>
+            </a:extLst>
+          </p:cNvPr>
+          <p:cNvSpPr txBox="1"/>
+          <p:nvPr/>
+        </p:nvSpPr>
+        <p:spPr>
+          <a:xfrm>
+            <a:off x="7854363" y="1631082"/>
+            <a:ext cx="901611" cy="200055"/>
+          </a:xfrm>
+          <a:prstGeom prst="rect">
+            <a:avLst/>
+          </a:prstGeom>
+          <a:noFill/>
+        </p:spPr>
+        <p:txBody>
+          <a:bodyPr wrap="square" rtlCol="0">
+            <a:spAutoFit/>
+          </a:bodyPr>
+          <a:lstStyle/>
+          <a:p>
+            <a:r>
+              <a:rPr lang="de-DE" sz="700" dirty="0">
+                <a:latin typeface="Arial" panose="020B0604020202020204" pitchFamily="34" charset="0"/>
+                <a:cs typeface="Arial" panose="020B0604020202020204" pitchFamily="34" charset="0"/>
+              </a:rPr>
+              <a:t>Eingang</a:t>
+            </a:r>
+          </a:p>
+        </p:txBody>
+      </p:sp>
     </p:spTree>
     <p:extLst>
       <p:ext uri="{BB962C8B-B14F-4D97-AF65-F5344CB8AC3E}">

</xml_diff>

<commit_message>
FL vor IT Schulung, TPD orange
</commit_message>
<xml_diff>
--- a/Website_TdA_2024.pptx
+++ b/Website_TdA_2024.pptx
@@ -2420,7 +2420,7 @@
           <a:p>
             <a:fld id="{326D799F-86D4-4539-9CF8-30237CED92B1}" type="datetimeFigureOut">
               <a:rPr lang="de-DE" smtClean="0"/>
-              <a:t>29.08.2024</a:t>
+              <a:t>30.08.2024</a:t>
             </a:fld>
             <a:endParaRPr lang="de-DE"/>
           </a:p>
@@ -2918,7 +2918,7 @@
           <a:p>
             <a:fld id="{5F34389D-718A-4B70-99B4-5B2AAB6EE550}" type="datetimeFigureOut">
               <a:rPr lang="de-DE" smtClean="0"/>
-              <a:t>29.08.2024</a:t>
+              <a:t>30.08.2024</a:t>
             </a:fld>
             <a:endParaRPr lang="de-DE"/>
           </a:p>
@@ -3116,7 +3116,7 @@
           <a:p>
             <a:fld id="{5F34389D-718A-4B70-99B4-5B2AAB6EE550}" type="datetimeFigureOut">
               <a:rPr lang="de-DE" smtClean="0"/>
-              <a:t>29.08.2024</a:t>
+              <a:t>30.08.2024</a:t>
             </a:fld>
             <a:endParaRPr lang="de-DE"/>
           </a:p>
@@ -3324,7 +3324,7 @@
           <a:p>
             <a:fld id="{5F34389D-718A-4B70-99B4-5B2AAB6EE550}" type="datetimeFigureOut">
               <a:rPr lang="de-DE" smtClean="0"/>
-              <a:t>29.08.2024</a:t>
+              <a:t>30.08.2024</a:t>
             </a:fld>
             <a:endParaRPr lang="de-DE"/>
           </a:p>
@@ -3522,7 +3522,7 @@
           <a:p>
             <a:fld id="{5F34389D-718A-4B70-99B4-5B2AAB6EE550}" type="datetimeFigureOut">
               <a:rPr lang="de-DE" smtClean="0"/>
-              <a:t>29.08.2024</a:t>
+              <a:t>30.08.2024</a:t>
             </a:fld>
             <a:endParaRPr lang="de-DE"/>
           </a:p>
@@ -3797,7 +3797,7 @@
           <a:p>
             <a:fld id="{5F34389D-718A-4B70-99B4-5B2AAB6EE550}" type="datetimeFigureOut">
               <a:rPr lang="de-DE" smtClean="0"/>
-              <a:t>29.08.2024</a:t>
+              <a:t>30.08.2024</a:t>
             </a:fld>
             <a:endParaRPr lang="de-DE"/>
           </a:p>
@@ -4062,7 +4062,7 @@
           <a:p>
             <a:fld id="{5F34389D-718A-4B70-99B4-5B2AAB6EE550}" type="datetimeFigureOut">
               <a:rPr lang="de-DE" smtClean="0"/>
-              <a:t>29.08.2024</a:t>
+              <a:t>30.08.2024</a:t>
             </a:fld>
             <a:endParaRPr lang="de-DE"/>
           </a:p>
@@ -4474,7 +4474,7 @@
           <a:p>
             <a:fld id="{5F34389D-718A-4B70-99B4-5B2AAB6EE550}" type="datetimeFigureOut">
               <a:rPr lang="de-DE" smtClean="0"/>
-              <a:t>29.08.2024</a:t>
+              <a:t>30.08.2024</a:t>
             </a:fld>
             <a:endParaRPr lang="de-DE"/>
           </a:p>
@@ -4615,7 +4615,7 @@
           <a:p>
             <a:fld id="{5F34389D-718A-4B70-99B4-5B2AAB6EE550}" type="datetimeFigureOut">
               <a:rPr lang="de-DE" smtClean="0"/>
-              <a:t>29.08.2024</a:t>
+              <a:t>30.08.2024</a:t>
             </a:fld>
             <a:endParaRPr lang="de-DE"/>
           </a:p>
@@ -4728,7 +4728,7 @@
           <a:p>
             <a:fld id="{5F34389D-718A-4B70-99B4-5B2AAB6EE550}" type="datetimeFigureOut">
               <a:rPr lang="de-DE" smtClean="0"/>
-              <a:t>29.08.2024</a:t>
+              <a:t>30.08.2024</a:t>
             </a:fld>
             <a:endParaRPr lang="de-DE"/>
           </a:p>
@@ -5039,7 +5039,7 @@
           <a:p>
             <a:fld id="{5F34389D-718A-4B70-99B4-5B2AAB6EE550}" type="datetimeFigureOut">
               <a:rPr lang="de-DE" smtClean="0"/>
-              <a:t>29.08.2024</a:t>
+              <a:t>30.08.2024</a:t>
             </a:fld>
             <a:endParaRPr lang="de-DE"/>
           </a:p>
@@ -5327,7 +5327,7 @@
           <a:p>
             <a:fld id="{5F34389D-718A-4B70-99B4-5B2AAB6EE550}" type="datetimeFigureOut">
               <a:rPr lang="de-DE" smtClean="0"/>
-              <a:t>29.08.2024</a:t>
+              <a:t>30.08.2024</a:t>
             </a:fld>
             <a:endParaRPr lang="de-DE"/>
           </a:p>
@@ -5568,7 +5568,7 @@
           <a:p>
             <a:fld id="{5F34389D-718A-4B70-99B4-5B2AAB6EE550}" type="datetimeFigureOut">
               <a:rPr lang="de-DE" smtClean="0"/>
-              <a:t>29.08.2024</a:t>
+              <a:t>30.08.2024</a:t>
             </a:fld>
             <a:endParaRPr lang="de-DE"/>
           </a:p>
@@ -17022,7 +17022,7 @@
             <a:avLst/>
           </a:prstGeom>
           <a:solidFill>
-            <a:srgbClr val="E4F0D5"/>
+            <a:schemeClr val="accent2"/>
           </a:solidFill>
           <a:ln>
             <a:noFill/>
@@ -17136,6 +17136,19 @@
         <p:txBody>
           <a:bodyPr lIns="72000" tIns="108000" rIns="0" bIns="0" rtlCol="0" anchor="t"/>
           <a:lstStyle/>
+          <a:p>
+            <a:pPr marL="171450" indent="-171450">
+              <a:buFont typeface="Arial" panose="020B0604020202020204" pitchFamily="34" charset="0"/>
+              <a:buChar char="•"/>
+            </a:pPr>
+            <a:endParaRPr lang="de-DE" sz="700" dirty="0">
+              <a:solidFill>
+                <a:schemeClr val="tx1"/>
+              </a:solidFill>
+              <a:latin typeface="Arial" panose="020B0604020202020204" pitchFamily="34" charset="0"/>
+              <a:cs typeface="Arial" panose="020B0604020202020204" pitchFamily="34" charset="0"/>
+            </a:endParaRPr>
+          </a:p>
           <a:p>
             <a:pPr marL="171450" indent="-171450">
               <a:buFont typeface="Arial" panose="020B0604020202020204" pitchFamily="34" charset="0"/>
@@ -17201,7 +17214,7 @@
         <p:spPr>
           <a:xfrm>
             <a:off x="6469159" y="3513793"/>
-            <a:ext cx="1159691" cy="961549"/>
+            <a:ext cx="1159691" cy="960119"/>
           </a:xfrm>
           <a:prstGeom prst="rect">
             <a:avLst/>
@@ -17242,10 +17255,10 @@
       </p:sp>
       <p:sp>
         <p:nvSpPr>
-          <p:cNvPr id="37" name="Rechteck 36">
-            <a:extLst>
-              <a:ext uri="{FF2B5EF4-FFF2-40B4-BE49-F238E27FC236}">
-                <a16:creationId xmlns:a16="http://schemas.microsoft.com/office/drawing/2014/main" id="{F5615F85-D030-E21C-12C4-2CB92DC79D81}"/>
+          <p:cNvPr id="38" name="Rechteck 37">
+            <a:extLst>
+              <a:ext uri="{FF2B5EF4-FFF2-40B4-BE49-F238E27FC236}">
+                <a16:creationId xmlns:a16="http://schemas.microsoft.com/office/drawing/2014/main" id="{79F88E2C-0694-8198-3CAF-21385E3DDC9C}"/>
               </a:ext>
             </a:extLst>
           </p:cNvPr>
@@ -17254,142 +17267,8 @@
         </p:nvSpPr>
         <p:spPr>
           <a:xfrm>
-            <a:off x="6152871" y="4473913"/>
-            <a:ext cx="1985289" cy="1658165"/>
-          </a:xfrm>
-          <a:prstGeom prst="rect">
-            <a:avLst/>
-          </a:prstGeom>
-          <a:solidFill>
-            <a:srgbClr val="EB4B30">
-              <a:alpha val="80000"/>
-            </a:srgbClr>
-          </a:solidFill>
-          <a:ln>
-            <a:noFill/>
-          </a:ln>
-        </p:spPr>
-        <p:style>
-          <a:lnRef idx="2">
-            <a:schemeClr val="accent1">
-              <a:shade val="15000"/>
-            </a:schemeClr>
-          </a:lnRef>
-          <a:fillRef idx="1">
-            <a:schemeClr val="accent1"/>
-          </a:fillRef>
-          <a:effectRef idx="0">
-            <a:schemeClr val="accent1"/>
-          </a:effectRef>
-          <a:fontRef idx="minor">
-            <a:schemeClr val="lt1"/>
-          </a:fontRef>
-        </p:style>
-        <p:txBody>
-          <a:bodyPr rtlCol="0" anchor="ctr"/>
-          <a:lstStyle/>
-          <a:p>
-            <a:pPr marL="171450" indent="-171450">
-              <a:buFont typeface="Arial" panose="020B0604020202020204" pitchFamily="34" charset="0"/>
-              <a:buChar char="•"/>
-            </a:pPr>
-            <a:r>
-              <a:rPr lang="de-DE" sz="700" dirty="0">
-                <a:solidFill>
-                  <a:schemeClr val="tx1"/>
-                </a:solidFill>
-                <a:latin typeface="Arial" panose="020B0604020202020204" pitchFamily="34" charset="0"/>
-                <a:cs typeface="Arial" panose="020B0604020202020204" pitchFamily="34" charset="0"/>
-              </a:rPr>
-              <a:t>Werkzeugmechaniker*</a:t>
-            </a:r>
-          </a:p>
-          <a:p>
-            <a:pPr marL="171450" indent="-171450">
-              <a:buFont typeface="Arial" panose="020B0604020202020204" pitchFamily="34" charset="0"/>
-              <a:buChar char="•"/>
-            </a:pPr>
-            <a:r>
-              <a:rPr lang="de-DE" sz="700" dirty="0">
-                <a:solidFill>
-                  <a:schemeClr val="tx1"/>
-                </a:solidFill>
-                <a:latin typeface="Arial" panose="020B0604020202020204" pitchFamily="34" charset="0"/>
-                <a:cs typeface="Arial" panose="020B0604020202020204" pitchFamily="34" charset="0"/>
-              </a:rPr>
-              <a:t>Industriemechaniker*</a:t>
-            </a:r>
-          </a:p>
-          <a:p>
-            <a:pPr marL="171450" indent="-171450">
-              <a:buFont typeface="Arial" panose="020B0604020202020204" pitchFamily="34" charset="0"/>
-              <a:buChar char="•"/>
-            </a:pPr>
-            <a:r>
-              <a:rPr lang="de-DE" sz="700" dirty="0">
-                <a:solidFill>
-                  <a:schemeClr val="tx1"/>
-                </a:solidFill>
-                <a:latin typeface="Arial" panose="020B0604020202020204" pitchFamily="34" charset="0"/>
-                <a:cs typeface="Arial" panose="020B0604020202020204" pitchFamily="34" charset="0"/>
-              </a:rPr>
-              <a:t>Maschinen- und Anlagenführer*</a:t>
-            </a:r>
-          </a:p>
-          <a:p>
-            <a:pPr marL="171450" indent="-171450">
-              <a:buFont typeface="Arial" panose="020B0604020202020204" pitchFamily="34" charset="0"/>
-              <a:buChar char="•"/>
-            </a:pPr>
-            <a:r>
-              <a:rPr lang="de-DE" sz="700" dirty="0">
-                <a:solidFill>
-                  <a:schemeClr val="tx1"/>
-                </a:solidFill>
-                <a:latin typeface="Arial" panose="020B0604020202020204" pitchFamily="34" charset="0"/>
-                <a:cs typeface="Arial" panose="020B0604020202020204" pitchFamily="34" charset="0"/>
-              </a:rPr>
-              <a:t>Kunststoff- und Kautschuktechnologe*</a:t>
-            </a:r>
-          </a:p>
-          <a:p>
-            <a:pPr marL="171450" indent="-171450">
-              <a:buFont typeface="Arial" panose="020B0604020202020204" pitchFamily="34" charset="0"/>
-              <a:buChar char="•"/>
-            </a:pPr>
-            <a:r>
-              <a:rPr lang="de-DE" sz="700" dirty="0">
-                <a:solidFill>
-                  <a:schemeClr val="tx1"/>
-                </a:solidFill>
-                <a:latin typeface="Arial" panose="020B0604020202020204" pitchFamily="34" charset="0"/>
-                <a:cs typeface="Arial" panose="020B0604020202020204" pitchFamily="34" charset="0"/>
-              </a:rPr>
-              <a:t>Fachlagerist*</a:t>
-            </a:r>
-          </a:p>
-          <a:p>
-            <a:pPr algn="ctr"/>
-            <a:endParaRPr lang="de-DE" dirty="0"/>
-          </a:p>
-        </p:txBody>
-      </p:sp>
-      <p:sp>
-        <p:nvSpPr>
-          <p:cNvPr id="38" name="Rechteck 37">
-            <a:extLst>
-              <a:ext uri="{FF2B5EF4-FFF2-40B4-BE49-F238E27FC236}">
-                <a16:creationId xmlns:a16="http://schemas.microsoft.com/office/drawing/2014/main" id="{79F88E2C-0694-8198-3CAF-21385E3DDC9C}"/>
-              </a:ext>
-            </a:extLst>
-          </p:cNvPr>
-          <p:cNvSpPr/>
-          <p:nvPr/>
-        </p:nvSpPr>
-        <p:spPr>
-          <a:xfrm>
-            <a:off x="6152872" y="6129923"/>
-            <a:ext cx="1312480" cy="375314"/>
+            <a:off x="6152872" y="6129922"/>
+            <a:ext cx="1312480" cy="375315"/>
           </a:xfrm>
           <a:prstGeom prst="rect">
             <a:avLst/>
@@ -17744,14 +17623,14 @@
         </p:nvSpPr>
         <p:spPr>
           <a:xfrm>
-            <a:off x="7650640" y="2779413"/>
-            <a:ext cx="487514" cy="700189"/>
+            <a:off x="7652879" y="2784572"/>
+            <a:ext cx="487514" cy="700741"/>
           </a:xfrm>
           <a:prstGeom prst="rect">
             <a:avLst/>
           </a:prstGeom>
           <a:solidFill>
-            <a:srgbClr val="FFF696">
+            <a:srgbClr val="ED7D31">
               <a:alpha val="80000"/>
             </a:srgbClr>
           </a:solidFill>
@@ -18681,6 +18560,215 @@
                 <a:cs typeface="Arial" panose="020B0604020202020204" pitchFamily="34" charset="0"/>
               </a:rPr>
               <a:t>Ausstellungs-fläche</a:t>
+            </a:r>
+          </a:p>
+        </p:txBody>
+      </p:sp>
+      <p:sp>
+        <p:nvSpPr>
+          <p:cNvPr id="37" name="Rechteck 36">
+            <a:extLst>
+              <a:ext uri="{FF2B5EF4-FFF2-40B4-BE49-F238E27FC236}">
+                <a16:creationId xmlns:a16="http://schemas.microsoft.com/office/drawing/2014/main" id="{F5615F85-D030-E21C-12C4-2CB92DC79D81}"/>
+              </a:ext>
+            </a:extLst>
+          </p:cNvPr>
+          <p:cNvSpPr/>
+          <p:nvPr/>
+        </p:nvSpPr>
+        <p:spPr>
+          <a:xfrm>
+            <a:off x="6152871" y="4473913"/>
+            <a:ext cx="1985289" cy="1658165"/>
+          </a:xfrm>
+          <a:prstGeom prst="rect">
+            <a:avLst/>
+          </a:prstGeom>
+          <a:solidFill>
+            <a:srgbClr val="EB4B30">
+              <a:alpha val="80000"/>
+            </a:srgbClr>
+          </a:solidFill>
+          <a:ln>
+            <a:noFill/>
+          </a:ln>
+        </p:spPr>
+        <p:style>
+          <a:lnRef idx="2">
+            <a:schemeClr val="accent1">
+              <a:shade val="15000"/>
+            </a:schemeClr>
+          </a:lnRef>
+          <a:fillRef idx="1">
+            <a:schemeClr val="accent1"/>
+          </a:fillRef>
+          <a:effectRef idx="0">
+            <a:schemeClr val="accent1"/>
+          </a:effectRef>
+          <a:fontRef idx="minor">
+            <a:schemeClr val="lt1"/>
+          </a:fontRef>
+        </p:style>
+        <p:txBody>
+          <a:bodyPr rtlCol="0" anchor="ctr"/>
+          <a:lstStyle/>
+          <a:p>
+            <a:pPr marL="171450" indent="-171450">
+              <a:buFont typeface="Arial" panose="020B0604020202020204" pitchFamily="34" charset="0"/>
+              <a:buChar char="•"/>
+            </a:pPr>
+            <a:r>
+              <a:rPr lang="de-DE" sz="700" dirty="0">
+                <a:solidFill>
+                  <a:schemeClr val="tx1"/>
+                </a:solidFill>
+                <a:latin typeface="Arial" panose="020B0604020202020204" pitchFamily="34" charset="0"/>
+                <a:cs typeface="Arial" panose="020B0604020202020204" pitchFamily="34" charset="0"/>
+              </a:rPr>
+              <a:t>Werkzeugmechaniker*</a:t>
+            </a:r>
+          </a:p>
+          <a:p>
+            <a:pPr marL="171450" indent="-171450">
+              <a:buFont typeface="Arial" panose="020B0604020202020204" pitchFamily="34" charset="0"/>
+              <a:buChar char="•"/>
+            </a:pPr>
+            <a:r>
+              <a:rPr lang="de-DE" sz="700" dirty="0">
+                <a:solidFill>
+                  <a:schemeClr val="tx1"/>
+                </a:solidFill>
+                <a:latin typeface="Arial" panose="020B0604020202020204" pitchFamily="34" charset="0"/>
+                <a:cs typeface="Arial" panose="020B0604020202020204" pitchFamily="34" charset="0"/>
+              </a:rPr>
+              <a:t>Industriemechaniker*</a:t>
+            </a:r>
+          </a:p>
+          <a:p>
+            <a:pPr marL="171450" indent="-171450">
+              <a:buFont typeface="Arial" panose="020B0604020202020204" pitchFamily="34" charset="0"/>
+              <a:buChar char="•"/>
+            </a:pPr>
+            <a:r>
+              <a:rPr lang="de-DE" sz="700" dirty="0">
+                <a:solidFill>
+                  <a:schemeClr val="tx1"/>
+                </a:solidFill>
+                <a:latin typeface="Arial" panose="020B0604020202020204" pitchFamily="34" charset="0"/>
+                <a:cs typeface="Arial" panose="020B0604020202020204" pitchFamily="34" charset="0"/>
+              </a:rPr>
+              <a:t>Maschinen- und Anlagenführer*</a:t>
+            </a:r>
+          </a:p>
+          <a:p>
+            <a:pPr marL="171450" indent="-171450">
+              <a:buFont typeface="Arial" panose="020B0604020202020204" pitchFamily="34" charset="0"/>
+              <a:buChar char="•"/>
+            </a:pPr>
+            <a:r>
+              <a:rPr lang="de-DE" sz="700" dirty="0">
+                <a:solidFill>
+                  <a:schemeClr val="tx1"/>
+                </a:solidFill>
+                <a:latin typeface="Arial" panose="020B0604020202020204" pitchFamily="34" charset="0"/>
+                <a:cs typeface="Arial" panose="020B0604020202020204" pitchFamily="34" charset="0"/>
+              </a:rPr>
+              <a:t>Kunststoff- und Kautschuktechnologe*</a:t>
+            </a:r>
+          </a:p>
+          <a:p>
+            <a:pPr algn="ctr"/>
+            <a:endParaRPr lang="de-DE" dirty="0"/>
+          </a:p>
+        </p:txBody>
+      </p:sp>
+      <p:pic>
+        <p:nvPicPr>
+          <p:cNvPr id="64" name="Grafik 63">
+            <a:extLst>
+              <a:ext uri="{FF2B5EF4-FFF2-40B4-BE49-F238E27FC236}">
+                <a16:creationId xmlns:a16="http://schemas.microsoft.com/office/drawing/2014/main" id="{A7313C81-925A-ED20-2E96-705E69666450}"/>
+              </a:ext>
+            </a:extLst>
+          </p:cNvPr>
+          <p:cNvPicPr>
+            <a:picLocks noChangeAspect="1"/>
+          </p:cNvPicPr>
+          <p:nvPr/>
+        </p:nvPicPr>
+        <p:blipFill>
+          <a:blip r:embed="rId20"/>
+          <a:stretch>
+            <a:fillRect/>
+          </a:stretch>
+        </p:blipFill>
+        <p:spPr>
+          <a:xfrm>
+            <a:off x="934181" y="2878070"/>
+            <a:ext cx="237025" cy="237025"/>
+          </a:xfrm>
+          <a:prstGeom prst="rect">
+            <a:avLst/>
+          </a:prstGeom>
+        </p:spPr>
+      </p:pic>
+      <p:sp>
+        <p:nvSpPr>
+          <p:cNvPr id="65" name="Rechteck 64">
+            <a:extLst>
+              <a:ext uri="{FF2B5EF4-FFF2-40B4-BE49-F238E27FC236}">
+                <a16:creationId xmlns:a16="http://schemas.microsoft.com/office/drawing/2014/main" id="{FE7DA7D9-CEF4-91DD-9E25-10AEC30D47C7}"/>
+              </a:ext>
+            </a:extLst>
+          </p:cNvPr>
+          <p:cNvSpPr/>
+          <p:nvPr/>
+        </p:nvSpPr>
+        <p:spPr>
+          <a:xfrm>
+            <a:off x="4814264" y="3322814"/>
+            <a:ext cx="325216" cy="474425"/>
+          </a:xfrm>
+          <a:prstGeom prst="rect">
+            <a:avLst/>
+          </a:prstGeom>
+          <a:solidFill>
+            <a:srgbClr val="EB4B30">
+              <a:alpha val="80000"/>
+            </a:srgbClr>
+          </a:solidFill>
+          <a:ln>
+            <a:noFill/>
+          </a:ln>
+        </p:spPr>
+        <p:style>
+          <a:lnRef idx="2">
+            <a:schemeClr val="accent1">
+              <a:shade val="15000"/>
+            </a:schemeClr>
+          </a:lnRef>
+          <a:fillRef idx="1">
+            <a:schemeClr val="accent1"/>
+          </a:fillRef>
+          <a:effectRef idx="0">
+            <a:schemeClr val="accent1"/>
+          </a:effectRef>
+          <a:fontRef idx="minor">
+            <a:schemeClr val="lt1"/>
+          </a:fontRef>
+        </p:style>
+        <p:txBody>
+          <a:bodyPr lIns="0" tIns="0" rIns="0" bIns="0" rtlCol="0" anchor="ctr"/>
+          <a:lstStyle/>
+          <a:p>
+            <a:pPr algn="ctr"/>
+            <a:r>
+              <a:rPr lang="de-DE" sz="700" dirty="0">
+                <a:solidFill>
+                  <a:schemeClr val="tx1"/>
+                </a:solidFill>
+              </a:rPr>
+              <a:t>Fach-lagerist*</a:t>
             </a:r>
           </a:p>
         </p:txBody>

</xml_diff>

<commit_message>
change position reaction game
</commit_message>
<xml_diff>
--- a/Website_TdA_2024.pptx
+++ b/Website_TdA_2024.pptx
@@ -22782,7 +22782,7 @@
           </a:fontRef>
         </p:style>
         <p:txBody>
-          <a:bodyPr rot="0" spcFirstLastPara="0" vert="horz" wrap="square" lIns="91440" tIns="45720" rIns="91440" bIns="45720" numCol="1" spcCol="0" rtlCol="0" fromWordArt="0" anchor="ctr" anchorCtr="0" forceAA="0" compatLnSpc="1">
+          <a:bodyPr rot="0" spcFirstLastPara="0" vert="horz" wrap="square" lIns="360000" tIns="216000" rIns="91440" bIns="45720" numCol="1" spcCol="0" rtlCol="0" fromWordArt="0" anchor="t" anchorCtr="0" forceAA="0" compatLnSpc="1">
             <a:prstTxWarp prst="textNoShape">
               <a:avLst/>
             </a:prstTxWarp>
@@ -22790,7 +22790,7 @@
           </a:bodyPr>
           <a:lstStyle/>
           <a:p>
-            <a:pPr marL="0" marR="0" lvl="0" indent="0" algn="l" defTabSz="914400" rtl="0" eaLnBrk="0" fontAlgn="base" latinLnBrk="0" hangingPunct="0">
+            <a:pPr marL="0" marR="0" lvl="0" indent="0" defTabSz="914400" rtl="0" eaLnBrk="0" fontAlgn="base" latinLnBrk="0" hangingPunct="0">
               <a:lnSpc>
                 <a:spcPct val="100000"/>
               </a:lnSpc>
@@ -22834,7 +22834,7 @@
             </a:endParaRPr>
           </a:p>
           <a:p>
-            <a:pPr marL="0" marR="0" lvl="0" indent="0" algn="l" defTabSz="914400" rtl="0" eaLnBrk="0" fontAlgn="base" latinLnBrk="0" hangingPunct="0">
+            <a:pPr marL="0" marR="0" lvl="0" indent="0" defTabSz="914400" rtl="0" eaLnBrk="0" fontAlgn="base" latinLnBrk="0" hangingPunct="0">
               <a:lnSpc>
                 <a:spcPct val="100000"/>
               </a:lnSpc>
@@ -22878,7 +22878,7 @@
             </a:endParaRPr>
           </a:p>
           <a:p>
-            <a:pPr marL="0" marR="0" lvl="0" indent="0" algn="l" defTabSz="914400" rtl="0" eaLnBrk="0" fontAlgn="base" latinLnBrk="0" hangingPunct="0">
+            <a:pPr marL="0" marR="0" lvl="0" indent="0" defTabSz="914400" rtl="0" eaLnBrk="0" fontAlgn="base" latinLnBrk="0" hangingPunct="0">
               <a:lnSpc>
                 <a:spcPct val="100000"/>
               </a:lnSpc>
@@ -24211,7 +24211,7 @@
         </p:nvSpPr>
         <p:spPr>
           <a:xfrm>
-            <a:off x="3238500" y="6755765"/>
+            <a:off x="3310803" y="7573036"/>
             <a:ext cx="361950" cy="342900"/>
           </a:xfrm>
           <a:prstGeom prst="irregularSeal1">
@@ -24368,7 +24368,7 @@
         </p:nvSpPr>
         <p:spPr bwMode="auto">
           <a:xfrm>
-            <a:off x="2901720" y="6516255"/>
+            <a:off x="2974023" y="7333526"/>
             <a:ext cx="876300" cy="485775"/>
           </a:xfrm>
           <a:prstGeom prst="rect">

</xml_diff>